<commit_message>
Updated file's cover page to TaskNinja
Also edited Architecture (removed Web cloud), Model (added new TaskProperties) and UI diagrams (removed brower panel)
</commit_message>
<xml_diff>
--- a/docs/diagrams/Diagrams.pptx
+++ b/docs/diagrams/Diagrams.pptx
@@ -215,7 +215,7 @@
           <a:p>
             <a:fld id="{F5CC4B3F-88C1-4FFA-B1B6-F41C21DC6924}" type="datetimeFigureOut">
               <a:rPr lang="en-US" smtClean="0"/>
-              <a:t>11/5/16</a:t>
+              <a:t>11/6/2016</a:t>
             </a:fld>
             <a:endParaRPr lang="en-US"/>
           </a:p>
@@ -664,7 +664,7 @@
           <a:p>
             <a:fld id="{78C97017-6FC3-485B-9764-EAC9E56C1D49}" type="datetimeFigureOut">
               <a:rPr lang="en-US" smtClean="0"/>
-              <a:t>11/5/16</a:t>
+              <a:t>11/6/2016</a:t>
             </a:fld>
             <a:endParaRPr lang="en-US"/>
           </a:p>
@@ -834,7 +834,7 @@
           <a:p>
             <a:fld id="{78C97017-6FC3-485B-9764-EAC9E56C1D49}" type="datetimeFigureOut">
               <a:rPr lang="en-US" smtClean="0"/>
-              <a:t>11/5/16</a:t>
+              <a:t>11/6/2016</a:t>
             </a:fld>
             <a:endParaRPr lang="en-US"/>
           </a:p>
@@ -1014,7 +1014,7 @@
           <a:p>
             <a:fld id="{78C97017-6FC3-485B-9764-EAC9E56C1D49}" type="datetimeFigureOut">
               <a:rPr lang="en-US" smtClean="0"/>
-              <a:t>11/5/16</a:t>
+              <a:t>11/6/2016</a:t>
             </a:fld>
             <a:endParaRPr lang="en-US"/>
           </a:p>
@@ -1184,7 +1184,7 @@
           <a:p>
             <a:fld id="{78C97017-6FC3-485B-9764-EAC9E56C1D49}" type="datetimeFigureOut">
               <a:rPr lang="en-US" smtClean="0"/>
-              <a:t>11/5/16</a:t>
+              <a:t>11/6/2016</a:t>
             </a:fld>
             <a:endParaRPr lang="en-US"/>
           </a:p>
@@ -1430,7 +1430,7 @@
           <a:p>
             <a:fld id="{78C97017-6FC3-485B-9764-EAC9E56C1D49}" type="datetimeFigureOut">
               <a:rPr lang="en-US" smtClean="0"/>
-              <a:t>11/5/16</a:t>
+              <a:t>11/6/2016</a:t>
             </a:fld>
             <a:endParaRPr lang="en-US"/>
           </a:p>
@@ -1718,7 +1718,7 @@
           <a:p>
             <a:fld id="{78C97017-6FC3-485B-9764-EAC9E56C1D49}" type="datetimeFigureOut">
               <a:rPr lang="en-US" smtClean="0"/>
-              <a:t>11/5/16</a:t>
+              <a:t>11/6/2016</a:t>
             </a:fld>
             <a:endParaRPr lang="en-US"/>
           </a:p>
@@ -2140,7 +2140,7 @@
           <a:p>
             <a:fld id="{78C97017-6FC3-485B-9764-EAC9E56C1D49}" type="datetimeFigureOut">
               <a:rPr lang="en-US" smtClean="0"/>
-              <a:t>11/5/16</a:t>
+              <a:t>11/6/2016</a:t>
             </a:fld>
             <a:endParaRPr lang="en-US"/>
           </a:p>
@@ -2258,7 +2258,7 @@
           <a:p>
             <a:fld id="{78C97017-6FC3-485B-9764-EAC9E56C1D49}" type="datetimeFigureOut">
               <a:rPr lang="en-US" smtClean="0"/>
-              <a:t>11/5/16</a:t>
+              <a:t>11/6/2016</a:t>
             </a:fld>
             <a:endParaRPr lang="en-US"/>
           </a:p>
@@ -2353,7 +2353,7 @@
           <a:p>
             <a:fld id="{78C97017-6FC3-485B-9764-EAC9E56C1D49}" type="datetimeFigureOut">
               <a:rPr lang="en-US" smtClean="0"/>
-              <a:t>11/5/16</a:t>
+              <a:t>11/6/2016</a:t>
             </a:fld>
             <a:endParaRPr lang="en-US"/>
           </a:p>
@@ -2630,7 +2630,7 @@
           <a:p>
             <a:fld id="{78C97017-6FC3-485B-9764-EAC9E56C1D49}" type="datetimeFigureOut">
               <a:rPr lang="en-US" smtClean="0"/>
-              <a:t>11/5/16</a:t>
+              <a:t>11/6/2016</a:t>
             </a:fld>
             <a:endParaRPr lang="en-US"/>
           </a:p>
@@ -2883,7 +2883,7 @@
           <a:p>
             <a:fld id="{78C97017-6FC3-485B-9764-EAC9E56C1D49}" type="datetimeFigureOut">
               <a:rPr lang="en-US" smtClean="0"/>
-              <a:t>11/5/16</a:t>
+              <a:t>11/6/2016</a:t>
             </a:fld>
             <a:endParaRPr lang="en-US"/>
           </a:p>
@@ -3096,7 +3096,7 @@
           <a:p>
             <a:fld id="{78C97017-6FC3-485B-9764-EAC9E56C1D49}" type="datetimeFigureOut">
               <a:rPr lang="en-US" smtClean="0"/>
-              <a:t>11/5/16</a:t>
+              <a:t>11/6/2016</a:t>
             </a:fld>
             <a:endParaRPr lang="en-US"/>
           </a:p>
@@ -3488,11 +3488,7 @@
           <a:p>
             <a:r>
               <a:rPr lang="en-US" dirty="0" err="1" smtClean="0"/>
-              <a:t>AddressBook</a:t>
-            </a:r>
-            <a:r>
-              <a:rPr lang="en-US" dirty="0" smtClean="0"/>
-              <a:t> – Level 4</a:t>
+              <a:t>TaskNinja</a:t>
             </a:r>
             <a:endParaRPr lang="en-US" dirty="0"/>
           </a:p>
@@ -4277,101 +4273,6 @@
           </a:p>
         </p:txBody>
       </p:sp>
-      <p:sp>
-        <p:nvSpPr>
-          <p:cNvPr id="51" name="Cloud 50"/>
-          <p:cNvSpPr/>
-          <p:nvPr/>
-        </p:nvSpPr>
-        <p:spPr>
-          <a:xfrm>
-            <a:off x="2650069" y="1447800"/>
-            <a:ext cx="914400" cy="533400"/>
-          </a:xfrm>
-          <a:prstGeom prst="cloud">
-            <a:avLst/>
-          </a:prstGeom>
-          <a:solidFill>
-            <a:schemeClr val="bg1"/>
-          </a:solidFill>
-          <a:ln>
-            <a:solidFill>
-              <a:schemeClr val="tx1"/>
-            </a:solidFill>
-          </a:ln>
-        </p:spPr>
-        <p:style>
-          <a:lnRef idx="2">
-            <a:schemeClr val="accent1">
-              <a:shade val="50000"/>
-            </a:schemeClr>
-          </a:lnRef>
-          <a:fillRef idx="1">
-            <a:schemeClr val="accent1"/>
-          </a:fillRef>
-          <a:effectRef idx="0">
-            <a:schemeClr val="accent1"/>
-          </a:effectRef>
-          <a:fontRef idx="minor">
-            <a:schemeClr val="lt1"/>
-          </a:fontRef>
-        </p:style>
-        <p:txBody>
-          <a:bodyPr rtlCol="0" anchor="ctr"/>
-          <a:lstStyle/>
-          <a:p>
-            <a:pPr algn="ctr"/>
-            <a:r>
-              <a:rPr lang="en-US" sz="1400" dirty="0">
-                <a:solidFill>
-                  <a:schemeClr val="tx1"/>
-                </a:solidFill>
-              </a:rPr>
-              <a:t>Web</a:t>
-            </a:r>
-          </a:p>
-        </p:txBody>
-      </p:sp>
-      <p:cxnSp>
-        <p:nvCxnSpPr>
-          <p:cNvPr id="52" name="Elbow Connector 51"/>
-          <p:cNvCxnSpPr>
-            <a:stCxn id="2" idx="0"/>
-            <a:endCxn id="51" idx="2"/>
-          </p:cNvCxnSpPr>
-          <p:nvPr/>
-        </p:nvCxnSpPr>
-        <p:spPr>
-          <a:xfrm rot="5400000" flipH="1" flipV="1">
-            <a:off x="2222648" y="1760922"/>
-            <a:ext cx="476678" cy="383835"/>
-          </a:xfrm>
-          <a:prstGeom prst="bentConnector2">
-            <a:avLst/>
-          </a:prstGeom>
-          <a:ln w="28575">
-            <a:solidFill>
-              <a:srgbClr val="00B050"/>
-            </a:solidFill>
-            <a:prstDash val="sysDot"/>
-            <a:tailEnd type="arrow"/>
-          </a:ln>
-        </p:spPr>
-        <p:style>
-          <a:lnRef idx="1">
-            <a:schemeClr val="accent1"/>
-          </a:lnRef>
-          <a:fillRef idx="0">
-            <a:schemeClr val="accent1"/>
-          </a:fillRef>
-          <a:effectRef idx="0">
-            <a:schemeClr val="accent1"/>
-          </a:effectRef>
-          <a:fontRef idx="minor">
-            <a:schemeClr val="tx1"/>
-          </a:fontRef>
-        </p:style>
-      </p:cxnSp>
       <p:sp>
         <p:nvSpPr>
           <p:cNvPr id="23" name="Rectangle 62"/>
@@ -7990,66 +7891,6 @@
       </p:sp>
       <p:sp>
         <p:nvSpPr>
-          <p:cNvPr id="34" name="Rectangle 11"/>
-          <p:cNvSpPr/>
-          <p:nvPr/>
-        </p:nvSpPr>
-        <p:spPr>
-          <a:xfrm>
-            <a:off x="2592528" y="3649359"/>
-            <a:ext cx="1093635" cy="236841"/>
-          </a:xfrm>
-          <a:prstGeom prst="rect">
-            <a:avLst/>
-          </a:prstGeom>
-          <a:ln w="19050">
-            <a:solidFill>
-              <a:schemeClr val="accent3"/>
-            </a:solidFill>
-          </a:ln>
-          <a:effectLst/>
-        </p:spPr>
-        <p:style>
-          <a:lnRef idx="1">
-            <a:schemeClr val="accent3"/>
-          </a:lnRef>
-          <a:fillRef idx="2">
-            <a:schemeClr val="accent3"/>
-          </a:fillRef>
-          <a:effectRef idx="1">
-            <a:schemeClr val="accent3"/>
-          </a:effectRef>
-          <a:fontRef idx="minor">
-            <a:schemeClr val="dk1"/>
-          </a:fontRef>
-        </p:style>
-        <p:txBody>
-          <a:bodyPr rtlCol="0" anchor="ctr"/>
-          <a:lstStyle/>
-          <a:p>
-            <a:pPr algn="ctr"/>
-            <a:r>
-              <a:rPr lang="en-US" sz="1050" b="1" dirty="0" err="1">
-                <a:solidFill>
-                  <a:schemeClr val="accent3">
-                    <a:lumMod val="75000"/>
-                  </a:schemeClr>
-                </a:solidFill>
-              </a:rPr>
-              <a:t>BrowserPanel</a:t>
-            </a:r>
-            <a:endParaRPr lang="en-SG" sz="1050" b="1" dirty="0">
-              <a:solidFill>
-                <a:schemeClr val="accent3">
-                  <a:lumMod val="75000"/>
-                </a:schemeClr>
-              </a:solidFill>
-            </a:endParaRPr>
-          </a:p>
-        </p:txBody>
-      </p:sp>
-      <p:sp>
-        <p:nvSpPr>
           <p:cNvPr id="35" name="Rectangle 11"/>
           <p:cNvSpPr/>
           <p:nvPr/>
@@ -8149,14 +7990,14 @@
           <a:p>
             <a:pPr algn="ctr"/>
             <a:r>
-              <a:rPr lang="en-US" sz="1050" b="1" dirty="0" err="1">
+              <a:rPr lang="en-US" sz="1050" b="1" dirty="0" err="1" smtClean="0">
                 <a:solidFill>
                   <a:schemeClr val="accent3">
                     <a:lumMod val="75000"/>
                   </a:schemeClr>
                 </a:solidFill>
               </a:rPr>
-              <a:t>PersonListPanel</a:t>
+              <a:t>TaskListPanel</a:t>
             </a:r>
             <a:endParaRPr lang="en-SG" sz="1050" b="1" dirty="0">
               <a:solidFill>
@@ -8209,14 +8050,14 @@
           <a:p>
             <a:pPr algn="ctr"/>
             <a:r>
-              <a:rPr lang="en-US" sz="1050" b="1" dirty="0" err="1">
+              <a:rPr lang="en-US" sz="1050" b="1" dirty="0" err="1" smtClean="0">
                 <a:solidFill>
                   <a:schemeClr val="accent3">
                     <a:lumMod val="75000"/>
                   </a:schemeClr>
                 </a:solidFill>
               </a:rPr>
-              <a:t>PersonCard</a:t>
+              <a:t>TaskCard</a:t>
             </a:r>
             <a:endParaRPr lang="en-SG" sz="1050" b="1" dirty="0">
               <a:solidFill>
@@ -8437,47 +8278,6 @@
           </a:p>
         </p:txBody>
       </p:sp>
-      <p:cxnSp>
-        <p:nvCxnSpPr>
-          <p:cNvPr id="44" name="Elbow Connector 63"/>
-          <p:cNvCxnSpPr>
-            <a:stCxn id="39" idx="2"/>
-            <a:endCxn id="34" idx="1"/>
-          </p:cNvCxnSpPr>
-          <p:nvPr/>
-        </p:nvCxnSpPr>
-        <p:spPr>
-          <a:xfrm rot="16200000" flipH="1">
-            <a:off x="2054450" y="3229701"/>
-            <a:ext cx="899755" cy="176402"/>
-          </a:xfrm>
-          <a:prstGeom prst="bentConnector2">
-            <a:avLst/>
-          </a:prstGeom>
-          <a:ln w="19050">
-            <a:solidFill>
-              <a:schemeClr val="accent3"/>
-            </a:solidFill>
-            <a:headEnd type="none" w="med" len="med"/>
-            <a:tailEnd type="arrow" w="med" len="med"/>
-          </a:ln>
-          <a:effectLst/>
-        </p:spPr>
-        <p:style>
-          <a:lnRef idx="1">
-            <a:schemeClr val="accent2"/>
-          </a:lnRef>
-          <a:fillRef idx="2">
-            <a:schemeClr val="accent2"/>
-          </a:fillRef>
-          <a:effectRef idx="1">
-            <a:schemeClr val="accent2"/>
-          </a:effectRef>
-          <a:fontRef idx="minor">
-            <a:schemeClr val="dk1"/>
-          </a:fontRef>
-        </p:style>
-      </p:cxnSp>
       <p:cxnSp>
         <p:nvCxnSpPr>
           <p:cNvPr id="47" name="Elbow Connector 63"/>
@@ -8733,47 +8533,6 @@
           <a:xfrm rot="5400000">
             <a:off x="4174488" y="2991741"/>
             <a:ext cx="2061222" cy="649740"/>
-          </a:xfrm>
-          <a:prstGeom prst="bentConnector2">
-            <a:avLst/>
-          </a:prstGeom>
-          <a:ln w="6350">
-            <a:solidFill>
-              <a:schemeClr val="accent3"/>
-            </a:solidFill>
-            <a:headEnd type="none" w="med" len="med"/>
-            <a:tailEnd type="none" w="med" len="med"/>
-          </a:ln>
-          <a:effectLst/>
-        </p:spPr>
-        <p:style>
-          <a:lnRef idx="1">
-            <a:schemeClr val="accent2"/>
-          </a:lnRef>
-          <a:fillRef idx="2">
-            <a:schemeClr val="accent2"/>
-          </a:fillRef>
-          <a:effectRef idx="1">
-            <a:schemeClr val="accent2"/>
-          </a:effectRef>
-          <a:fontRef idx="minor">
-            <a:schemeClr val="dk1"/>
-          </a:fontRef>
-        </p:style>
-      </p:cxnSp>
-      <p:cxnSp>
-        <p:nvCxnSpPr>
-          <p:cNvPr id="82" name="Elbow Connector 63"/>
-          <p:cNvCxnSpPr>
-            <a:stCxn id="16" idx="3"/>
-            <a:endCxn id="34" idx="3"/>
-          </p:cNvCxnSpPr>
-          <p:nvPr/>
-        </p:nvCxnSpPr>
-        <p:spPr>
-          <a:xfrm rot="5400000">
-            <a:off x="3867176" y="2104987"/>
-            <a:ext cx="1481780" cy="1843806"/>
           </a:xfrm>
           <a:prstGeom prst="bentConnector2">
             <a:avLst/>
@@ -11740,15 +11499,7 @@
                         <a:srgbClr val="0070C0"/>
                       </a:solidFill>
                     </a:rPr>
-                    <a:t>Edit</a:t>
-                  </a:r>
-                  <a:r>
-                    <a:rPr lang="en-US" sz="1050" b="1" dirty="0" err="1" smtClean="0">
-                      <a:solidFill>
-                        <a:srgbClr val="0070C0"/>
-                      </a:solidFill>
-                    </a:rPr>
-                    <a:t>Command</a:t>
+                    <a:t>EditCommand</a:t>
                   </a:r>
                   <a:endParaRPr lang="en-SG" sz="1050" b="1" dirty="0">
                     <a:solidFill>
@@ -13029,15 +12780,7 @@
                   <a:srgbClr val="0070C0"/>
                 </a:solidFill>
               </a:rPr>
-              <a:t>execute</a:t>
-            </a:r>
-            <a:r>
-              <a:rPr lang="en-US" sz="1400" dirty="0" smtClean="0">
-                <a:solidFill>
-                  <a:srgbClr val="0070C0"/>
-                </a:solidFill>
-              </a:rPr>
-              <a:t>(“</a:t>
+              <a:t>execute(“</a:t>
             </a:r>
             <a:r>
               <a:rPr lang="en-US" sz="1400" smtClean="0">
@@ -13045,15 +12788,7 @@
                   <a:srgbClr val="0070C0"/>
                 </a:solidFill>
               </a:rPr>
-              <a:t>add Name</a:t>
-            </a:r>
-            <a:r>
-              <a:rPr lang="en-US" sz="1400" smtClean="0">
-                <a:solidFill>
-                  <a:srgbClr val="0070C0"/>
-                </a:solidFill>
-              </a:rPr>
-              <a:t>”)</a:t>
+              <a:t>add Name”)</a:t>
             </a:r>
             <a:endParaRPr lang="en-US" sz="1400" dirty="0">
               <a:solidFill>
@@ -13750,11 +13485,7 @@
           <a:p>
             <a:r>
               <a:rPr lang="en-US" dirty="0" smtClean="0"/>
-              <a:t>parse</a:t>
-            </a:r>
-            <a:r>
-              <a:rPr lang="en-US" dirty="0" smtClean="0"/>
-              <a:t>(“add Name”)</a:t>
+              <a:t>parse(“add Name”)</a:t>
             </a:r>
             <a:endParaRPr lang="en-US" dirty="0"/>
           </a:p>
@@ -14074,7 +13805,6 @@
               <a:rPr lang="en-US" dirty="0"/>
               <a:t>a</a:t>
             </a:r>
-            <a:endParaRPr lang="en-US" dirty="0"/>
           </a:p>
         </p:txBody>
       </p:sp>
@@ -14342,11 +14072,7 @@
           <a:p>
             <a:r>
               <a:rPr lang="en-US" dirty="0" smtClean="0"/>
-              <a:t>parse</a:t>
-            </a:r>
-            <a:r>
-              <a:rPr lang="en-US" dirty="0" smtClean="0"/>
-              <a:t>(“Name”)</a:t>
+              <a:t>parse(“Name”)</a:t>
             </a:r>
             <a:endParaRPr lang="en-US" dirty="0"/>
           </a:p>
@@ -14710,14 +14436,14 @@
       </p:grpSpPr>
       <p:sp>
         <p:nvSpPr>
-          <p:cNvPr id="118" name="Rectangle 65"/>
+          <p:cNvPr id="45" name="Rectangle 65"/>
           <p:cNvSpPr/>
           <p:nvPr/>
         </p:nvSpPr>
         <p:spPr>
           <a:xfrm>
-            <a:off x="1119865" y="1727200"/>
-            <a:ext cx="7490735" cy="2997200"/>
+            <a:off x="819374" y="1727200"/>
+            <a:ext cx="7715026" cy="2997200"/>
           </a:xfrm>
           <a:prstGeom prst="roundRect">
             <a:avLst>
@@ -14771,13 +14497,13 @@
       </p:sp>
       <p:sp>
         <p:nvSpPr>
-          <p:cNvPr id="2" name="Rectangle 8"/>
+          <p:cNvPr id="50" name="Rectangle 8"/>
           <p:cNvSpPr/>
           <p:nvPr/>
         </p:nvSpPr>
         <p:spPr>
           <a:xfrm>
-            <a:off x="2877180" y="3158440"/>
+            <a:off x="2576689" y="3158440"/>
             <a:ext cx="1093635" cy="346760"/>
           </a:xfrm>
           <a:prstGeom prst="rect">
@@ -14830,13 +14556,13 @@
       </p:sp>
       <p:sp>
         <p:nvSpPr>
-          <p:cNvPr id="9" name="Rectangle 62"/>
+          <p:cNvPr id="52" name="Rectangle 62"/>
           <p:cNvSpPr/>
           <p:nvPr/>
         </p:nvSpPr>
         <p:spPr>
           <a:xfrm rot="16200000">
-            <a:off x="1683963" y="2868687"/>
+            <a:off x="1383472" y="2868687"/>
             <a:ext cx="1093635" cy="346760"/>
           </a:xfrm>
           <a:prstGeom prst="rect">
@@ -14889,16 +14615,16 @@
       </p:sp>
       <p:cxnSp>
         <p:nvCxnSpPr>
-          <p:cNvPr id="53" name="Elbow Connector 63"/>
+          <p:cNvPr id="54" name="Elbow Connector 63"/>
           <p:cNvCxnSpPr>
-            <a:stCxn id="71" idx="3"/>
-            <a:endCxn id="62" idx="2"/>
+            <a:stCxn id="70" idx="3"/>
+            <a:endCxn id="94" idx="2"/>
           </p:cNvCxnSpPr>
           <p:nvPr/>
         </p:nvCxnSpPr>
         <p:spPr>
           <a:xfrm flipV="1">
-            <a:off x="6477000" y="3204826"/>
+            <a:off x="6176509" y="3204826"/>
             <a:ext cx="190770" cy="405819"/>
           </a:xfrm>
           <a:prstGeom prst="bentConnector2">
@@ -14931,15 +14657,15 @@
       </p:cxnSp>
       <p:cxnSp>
         <p:nvCxnSpPr>
-          <p:cNvPr id="107" name="Elbow Connector 106"/>
+          <p:cNvPr id="56" name="Elbow Connector 55"/>
           <p:cNvCxnSpPr>
-            <a:stCxn id="9" idx="1"/>
+            <a:stCxn id="52" idx="1"/>
           </p:cNvCxnSpPr>
           <p:nvPr/>
         </p:nvCxnSpPr>
         <p:spPr>
           <a:xfrm rot="5400000" flipH="1" flipV="1">
-            <a:off x="4360065" y="1080909"/>
+            <a:off x="4059574" y="1080909"/>
             <a:ext cx="378691" cy="4637261"/>
           </a:xfrm>
           <a:prstGeom prst="bentConnector4">
@@ -14975,13 +14701,13 @@
       </p:cxnSp>
       <p:sp>
         <p:nvSpPr>
-          <p:cNvPr id="119" name="Rectangle 62"/>
+          <p:cNvPr id="60" name="Rectangle 62"/>
           <p:cNvSpPr/>
           <p:nvPr/>
         </p:nvSpPr>
         <p:spPr>
           <a:xfrm rot="16200000">
-            <a:off x="956202" y="2861202"/>
+            <a:off x="655711" y="2861202"/>
             <a:ext cx="1093635" cy="346760"/>
           </a:xfrm>
           <a:prstGeom prst="rect">
@@ -15045,13 +14771,13 @@
       </p:sp>
       <p:sp>
         <p:nvSpPr>
-          <p:cNvPr id="120" name="Isosceles Triangle 102"/>
+          <p:cNvPr id="61" name="Isosceles Triangle 102"/>
           <p:cNvSpPr/>
           <p:nvPr/>
         </p:nvSpPr>
         <p:spPr>
           <a:xfrm rot="16200000">
-            <a:off x="1626910" y="2952291"/>
+            <a:off x="1326419" y="2952291"/>
             <a:ext cx="270504" cy="175523"/>
           </a:xfrm>
           <a:prstGeom prst="triangle">
@@ -15092,16 +14818,16 @@
       </p:sp>
       <p:cxnSp>
         <p:nvCxnSpPr>
-          <p:cNvPr id="55" name="Straight Arrow Connector 54"/>
+          <p:cNvPr id="65" name="Straight Arrow Connector 64"/>
           <p:cNvCxnSpPr>
-            <a:stCxn id="62" idx="0"/>
-            <a:endCxn id="67" idx="2"/>
+            <a:stCxn id="94" idx="0"/>
+            <a:endCxn id="98" idx="2"/>
           </p:cNvCxnSpPr>
           <p:nvPr/>
         </p:nvCxnSpPr>
         <p:spPr>
           <a:xfrm flipV="1">
-            <a:off x="6667770" y="2632344"/>
+            <a:off x="6367279" y="2632344"/>
             <a:ext cx="1612" cy="225722"/>
           </a:xfrm>
           <a:prstGeom prst="straightConnector1">
@@ -15134,16 +14860,16 @@
       </p:cxnSp>
       <p:cxnSp>
         <p:nvCxnSpPr>
-          <p:cNvPr id="58" name="Straight Arrow Connector 57"/>
+          <p:cNvPr id="66" name="Straight Arrow Connector 65"/>
           <p:cNvCxnSpPr>
-            <a:stCxn id="42" idx="3"/>
-            <a:endCxn id="2" idx="1"/>
+            <a:stCxn id="77" idx="3"/>
+            <a:endCxn id="50" idx="1"/>
           </p:cNvCxnSpPr>
           <p:nvPr/>
         </p:nvCxnSpPr>
         <p:spPr>
           <a:xfrm>
-            <a:off x="2656370" y="3326536"/>
+            <a:off x="2355879" y="3326536"/>
             <a:ext cx="220810" cy="5284"/>
           </a:xfrm>
           <a:prstGeom prst="straightConnector1">
@@ -15175,13 +14901,13 @@
       </p:cxnSp>
       <p:sp>
         <p:nvSpPr>
-          <p:cNvPr id="71" name="Isosceles Triangle 102"/>
+          <p:cNvPr id="70" name="Isosceles Triangle 102"/>
           <p:cNvSpPr/>
           <p:nvPr/>
         </p:nvSpPr>
         <p:spPr>
           <a:xfrm rot="5400000" flipV="1">
-            <a:off x="6253986" y="3522883"/>
+            <a:off x="5953495" y="3522883"/>
             <a:ext cx="270504" cy="175523"/>
           </a:xfrm>
           <a:prstGeom prst="triangle">
@@ -15226,13 +14952,13 @@
       </p:sp>
       <p:cxnSp>
         <p:nvCxnSpPr>
-          <p:cNvPr id="75" name="Elbow Connector 122"/>
+          <p:cNvPr id="73" name="Elbow Connector 122"/>
           <p:cNvCxnSpPr/>
           <p:nvPr/>
         </p:nvCxnSpPr>
         <p:spPr>
           <a:xfrm>
-            <a:off x="910091" y="3040053"/>
+            <a:off x="609600" y="3040053"/>
             <a:ext cx="419548" cy="2860"/>
           </a:xfrm>
           <a:prstGeom prst="bentConnector3">
@@ -15269,15 +14995,15 @@
       </p:cxnSp>
       <p:cxnSp>
         <p:nvCxnSpPr>
-          <p:cNvPr id="21" name="Straight Connector 20"/>
+          <p:cNvPr id="74" name="Straight Connector 73"/>
           <p:cNvCxnSpPr>
-            <a:stCxn id="120" idx="3"/>
+            <a:stCxn id="61" idx="3"/>
           </p:cNvCxnSpPr>
           <p:nvPr/>
         </p:nvCxnSpPr>
         <p:spPr>
           <a:xfrm flipV="1">
-            <a:off x="1849924" y="3040052"/>
+            <a:off x="1549433" y="3040052"/>
             <a:ext cx="216105" cy="1"/>
           </a:xfrm>
           <a:prstGeom prst="line">
@@ -15310,13 +15036,13 @@
       </p:cxnSp>
       <p:sp>
         <p:nvSpPr>
-          <p:cNvPr id="42" name="Flowchart: Decision 96"/>
+          <p:cNvPr id="77" name="Flowchart: Decision 96"/>
           <p:cNvSpPr/>
           <p:nvPr/>
         </p:nvSpPr>
         <p:spPr>
           <a:xfrm>
-            <a:off x="2420322" y="3239846"/>
+            <a:off x="2119831" y="3239846"/>
             <a:ext cx="236048" cy="173380"/>
           </a:xfrm>
           <a:prstGeom prst="flowChartDecision">
@@ -15355,13 +15081,13 @@
       </p:sp>
       <p:sp>
         <p:nvSpPr>
-          <p:cNvPr id="46" name="Rectangle 8"/>
+          <p:cNvPr id="82" name="Rectangle 8"/>
           <p:cNvSpPr/>
           <p:nvPr/>
         </p:nvSpPr>
         <p:spPr>
           <a:xfrm>
-            <a:off x="2879490" y="2627420"/>
+            <a:off x="2578999" y="2627420"/>
             <a:ext cx="1093635" cy="346760"/>
           </a:xfrm>
           <a:prstGeom prst="rect">
@@ -15399,7 +15125,7 @@
                   <a:srgbClr val="7030A0"/>
                 </a:solidFill>
               </a:rPr>
-              <a:t>AddressBook</a:t>
+              <a:t>TaskManager</a:t>
             </a:r>
             <a:endParaRPr lang="en-SG" sz="1050" dirty="0">
               <a:solidFill>
@@ -15411,16 +15137,16 @@
       </p:sp>
       <p:cxnSp>
         <p:nvCxnSpPr>
-          <p:cNvPr id="47" name="Straight Arrow Connector 46"/>
+          <p:cNvPr id="87" name="Straight Arrow Connector 86"/>
           <p:cNvCxnSpPr>
-            <a:stCxn id="48" idx="3"/>
-            <a:endCxn id="46" idx="1"/>
+            <a:stCxn id="88" idx="3"/>
+            <a:endCxn id="82" idx="1"/>
           </p:cNvCxnSpPr>
           <p:nvPr/>
         </p:nvCxnSpPr>
         <p:spPr>
           <a:xfrm>
-            <a:off x="2658680" y="2795516"/>
+            <a:off x="2358189" y="2795516"/>
             <a:ext cx="220810" cy="5284"/>
           </a:xfrm>
           <a:prstGeom prst="straightConnector1">
@@ -15452,13 +15178,13 @@
       </p:cxnSp>
       <p:sp>
         <p:nvSpPr>
-          <p:cNvPr id="48" name="Flowchart: Decision 96"/>
+          <p:cNvPr id="88" name="Flowchart: Decision 96"/>
           <p:cNvSpPr/>
           <p:nvPr/>
         </p:nvSpPr>
         <p:spPr>
           <a:xfrm>
-            <a:off x="2422632" y="2708826"/>
+            <a:off x="2122141" y="2708826"/>
             <a:ext cx="236048" cy="173380"/>
           </a:xfrm>
           <a:prstGeom prst="flowChartDecision">
@@ -15497,13 +15223,13 @@
       </p:sp>
       <p:sp>
         <p:nvSpPr>
-          <p:cNvPr id="49" name="Rectangle 8"/>
+          <p:cNvPr id="89" name="Rectangle 8"/>
           <p:cNvSpPr/>
           <p:nvPr/>
         </p:nvSpPr>
         <p:spPr>
           <a:xfrm>
-            <a:off x="4487017" y="2847371"/>
+            <a:off x="4186526" y="2847371"/>
             <a:ext cx="1156969" cy="346760"/>
           </a:xfrm>
           <a:prstGeom prst="rect">
@@ -15541,7 +15267,7 @@
                   <a:srgbClr val="7030A0"/>
                 </a:solidFill>
               </a:rPr>
-              <a:t>UniquePersonList</a:t>
+              <a:t>UniqueTaskList</a:t>
             </a:r>
             <a:endParaRPr lang="en-SG" sz="1050" dirty="0">
               <a:solidFill>
@@ -15553,13 +15279,13 @@
       </p:sp>
       <p:sp>
         <p:nvSpPr>
-          <p:cNvPr id="51" name="Flowchart: Decision 96"/>
+          <p:cNvPr id="90" name="Flowchart: Decision 96"/>
           <p:cNvSpPr/>
           <p:nvPr/>
         </p:nvSpPr>
         <p:spPr>
           <a:xfrm>
-            <a:off x="3984303" y="2673991"/>
+            <a:off x="3683812" y="2673991"/>
             <a:ext cx="236048" cy="173380"/>
           </a:xfrm>
           <a:prstGeom prst="flowChartDecision">
@@ -15600,16 +15326,16 @@
       </p:sp>
       <p:cxnSp>
         <p:nvCxnSpPr>
-          <p:cNvPr id="30" name="Elbow Connector 29"/>
+          <p:cNvPr id="91" name="Elbow Connector 90"/>
           <p:cNvCxnSpPr>
-            <a:stCxn id="51" idx="3"/>
-            <a:endCxn id="49" idx="1"/>
+            <a:stCxn id="90" idx="3"/>
+            <a:endCxn id="89" idx="1"/>
           </p:cNvCxnSpPr>
           <p:nvPr/>
         </p:nvCxnSpPr>
         <p:spPr>
           <a:xfrm>
-            <a:off x="4220351" y="2760681"/>
+            <a:off x="3919860" y="2760681"/>
             <a:ext cx="266666" cy="260070"/>
           </a:xfrm>
           <a:prstGeom prst="bentConnector3">
@@ -15641,13 +15367,13 @@
       </p:cxnSp>
       <p:sp>
         <p:nvSpPr>
-          <p:cNvPr id="57" name="Rectangle 8"/>
+          <p:cNvPr id="92" name="Rectangle 8"/>
           <p:cNvSpPr/>
           <p:nvPr/>
         </p:nvSpPr>
         <p:spPr>
           <a:xfrm>
-            <a:off x="4503204" y="2280569"/>
+            <a:off x="4202713" y="2280569"/>
             <a:ext cx="1156969" cy="346760"/>
           </a:xfrm>
           <a:prstGeom prst="rect">
@@ -15697,21 +15423,21 @@
       </p:sp>
       <p:cxnSp>
         <p:nvCxnSpPr>
-          <p:cNvPr id="59" name="Elbow Connector 58"/>
+          <p:cNvPr id="93" name="Elbow Connector 92"/>
           <p:cNvCxnSpPr>
-            <a:stCxn id="51" idx="3"/>
-            <a:endCxn id="57" idx="1"/>
+            <a:stCxn id="90" idx="3"/>
+            <a:endCxn id="92" idx="1"/>
           </p:cNvCxnSpPr>
           <p:nvPr/>
         </p:nvCxnSpPr>
         <p:spPr>
           <a:xfrm flipV="1">
-            <a:off x="4220351" y="2453949"/>
+            <a:off x="3919860" y="2453949"/>
             <a:ext cx="282853" cy="306732"/>
           </a:xfrm>
           <a:prstGeom prst="bentConnector3">
             <a:avLst>
-              <a:gd name="adj1" fmla="val 50000"/>
+              <a:gd name="adj1" fmla="val 46799"/>
             </a:avLst>
           </a:prstGeom>
           <a:ln w="19050">
@@ -15740,13 +15466,13 @@
       </p:cxnSp>
       <p:sp>
         <p:nvSpPr>
-          <p:cNvPr id="62" name="Rectangle 8"/>
+          <p:cNvPr id="94" name="Rectangle 8"/>
           <p:cNvSpPr/>
           <p:nvPr/>
         </p:nvSpPr>
         <p:spPr>
           <a:xfrm>
-            <a:off x="6313677" y="2858066"/>
+            <a:off x="6013186" y="2858066"/>
             <a:ext cx="708186" cy="346760"/>
           </a:xfrm>
           <a:prstGeom prst="rect">
@@ -15784,7 +15510,7 @@
                   <a:srgbClr val="7030A0"/>
                 </a:solidFill>
               </a:rPr>
-              <a:t>Person</a:t>
+              <a:t>Task</a:t>
             </a:r>
             <a:endParaRPr lang="en-SG" sz="1050" dirty="0">
               <a:solidFill>
@@ -15796,13 +15522,13 @@
       </p:sp>
       <p:sp>
         <p:nvSpPr>
-          <p:cNvPr id="63" name="Flowchart: Decision 96"/>
+          <p:cNvPr id="95" name="Flowchart: Decision 96"/>
           <p:cNvSpPr/>
           <p:nvPr/>
         </p:nvSpPr>
         <p:spPr>
           <a:xfrm>
-            <a:off x="5643227" y="2943979"/>
+            <a:off x="5342736" y="2943979"/>
             <a:ext cx="236048" cy="173380"/>
           </a:xfrm>
           <a:prstGeom prst="flowChartDecision">
@@ -15841,16 +15567,16 @@
       </p:sp>
       <p:cxnSp>
         <p:nvCxnSpPr>
-          <p:cNvPr id="64" name="Elbow Connector 63"/>
+          <p:cNvPr id="96" name="Elbow Connector 95"/>
           <p:cNvCxnSpPr>
-            <a:stCxn id="63" idx="3"/>
-            <a:endCxn id="62" idx="1"/>
+            <a:stCxn id="95" idx="3"/>
+            <a:endCxn id="94" idx="1"/>
           </p:cNvCxnSpPr>
           <p:nvPr/>
         </p:nvCxnSpPr>
         <p:spPr>
           <a:xfrm>
-            <a:off x="5879275" y="3030669"/>
+            <a:off x="5578784" y="3030669"/>
             <a:ext cx="434402" cy="777"/>
           </a:xfrm>
           <a:prstGeom prst="bentConnector3">
@@ -15882,13 +15608,13 @@
       </p:cxnSp>
       <p:sp>
         <p:nvSpPr>
-          <p:cNvPr id="67" name="Rectangle 8"/>
+          <p:cNvPr id="98" name="Rectangle 8"/>
           <p:cNvSpPr/>
           <p:nvPr/>
         </p:nvSpPr>
         <p:spPr>
           <a:xfrm>
-            <a:off x="6315289" y="2285584"/>
+            <a:off x="6014798" y="2285584"/>
             <a:ext cx="708186" cy="346760"/>
           </a:xfrm>
           <a:prstGeom prst="rect">
@@ -15938,13 +15664,13 @@
       </p:sp>
       <p:sp>
         <p:nvSpPr>
-          <p:cNvPr id="68" name="Flowchart: Decision 96"/>
+          <p:cNvPr id="101" name="Flowchart: Decision 96"/>
           <p:cNvSpPr/>
           <p:nvPr/>
         </p:nvSpPr>
         <p:spPr>
           <a:xfrm>
-            <a:off x="5672547" y="2371497"/>
+            <a:off x="5372056" y="2371497"/>
             <a:ext cx="236048" cy="173380"/>
           </a:xfrm>
           <a:prstGeom prst="flowChartDecision">
@@ -15983,16 +15709,16 @@
       </p:sp>
       <p:cxnSp>
         <p:nvCxnSpPr>
-          <p:cNvPr id="69" name="Elbow Connector 68"/>
+          <p:cNvPr id="102" name="Elbow Connector 101"/>
           <p:cNvCxnSpPr>
-            <a:stCxn id="68" idx="3"/>
-            <a:endCxn id="67" idx="1"/>
+            <a:stCxn id="101" idx="3"/>
+            <a:endCxn id="98" idx="1"/>
           </p:cNvCxnSpPr>
           <p:nvPr/>
         </p:nvCxnSpPr>
         <p:spPr>
           <a:xfrm>
-            <a:off x="5908595" y="2458187"/>
+            <a:off x="5608104" y="2458187"/>
             <a:ext cx="406694" cy="777"/>
           </a:xfrm>
           <a:prstGeom prst="bentConnector3">
@@ -16024,13 +15750,13 @@
       </p:cxnSp>
       <p:sp>
         <p:nvSpPr>
-          <p:cNvPr id="72" name="Rectangle 8"/>
+          <p:cNvPr id="103" name="Rectangle 8"/>
           <p:cNvSpPr/>
           <p:nvPr/>
         </p:nvSpPr>
         <p:spPr>
           <a:xfrm>
-            <a:off x="5128257" y="3429000"/>
+            <a:off x="4827766" y="3429000"/>
             <a:ext cx="1156969" cy="346760"/>
           </a:xfrm>
           <a:prstGeom prst="rect">
@@ -16083,7 +15809,7 @@
                   <a:srgbClr val="7030A0"/>
                 </a:solidFill>
               </a:rPr>
-              <a:t>ReadOnlyPerson</a:t>
+              <a:t>ReadOnlyTask</a:t>
             </a:r>
             <a:endParaRPr lang="en-SG" sz="1050" dirty="0">
               <a:solidFill>
@@ -16095,14 +15821,14 @@
       </p:sp>
       <p:sp>
         <p:nvSpPr>
-          <p:cNvPr id="76" name="Rectangle 8"/>
+          <p:cNvPr id="104" name="Rectangle 8"/>
           <p:cNvSpPr/>
           <p:nvPr/>
         </p:nvSpPr>
         <p:spPr>
           <a:xfrm>
-            <a:off x="7712397" y="2564238"/>
-            <a:ext cx="708186" cy="285783"/>
+            <a:off x="7411906" y="2564238"/>
+            <a:ext cx="893894" cy="285783"/>
           </a:xfrm>
           <a:prstGeom prst="rect">
             <a:avLst/>
@@ -16139,7 +15865,7 @@
                   <a:srgbClr val="7030A0"/>
                 </a:solidFill>
               </a:rPr>
-              <a:t>Name</a:t>
+              <a:t>Venue</a:t>
             </a:r>
             <a:endParaRPr lang="en-SG" sz="1050" dirty="0">
               <a:solidFill>
@@ -16151,13 +15877,13 @@
       </p:sp>
       <p:sp>
         <p:nvSpPr>
-          <p:cNvPr id="78" name="Flowchart: Decision 96"/>
+          <p:cNvPr id="105" name="Flowchart: Decision 96"/>
           <p:cNvSpPr/>
           <p:nvPr/>
         </p:nvSpPr>
         <p:spPr>
           <a:xfrm>
-            <a:off x="7041947" y="2948201"/>
+            <a:off x="6741456" y="2948201"/>
             <a:ext cx="236048" cy="173380"/>
           </a:xfrm>
           <a:prstGeom prst="flowChartDecision">
@@ -16198,16 +15924,16 @@
       </p:sp>
       <p:cxnSp>
         <p:nvCxnSpPr>
-          <p:cNvPr id="79" name="Elbow Connector 78"/>
+          <p:cNvPr id="106" name="Elbow Connector 105"/>
           <p:cNvCxnSpPr>
-            <a:stCxn id="78" idx="3"/>
-            <a:endCxn id="76" idx="1"/>
+            <a:stCxn id="105" idx="3"/>
+            <a:endCxn id="104" idx="1"/>
           </p:cNvCxnSpPr>
           <p:nvPr/>
         </p:nvCxnSpPr>
         <p:spPr>
           <a:xfrm flipV="1">
-            <a:off x="7277995" y="2707130"/>
+            <a:off x="6977504" y="2707130"/>
             <a:ext cx="434402" cy="327761"/>
           </a:xfrm>
           <a:prstGeom prst="bentConnector3">
@@ -16239,14 +15965,14 @@
       </p:cxnSp>
       <p:sp>
         <p:nvSpPr>
-          <p:cNvPr id="80" name="Rectangle 8"/>
+          <p:cNvPr id="108" name="Rectangle 8"/>
           <p:cNvSpPr/>
           <p:nvPr/>
         </p:nvSpPr>
         <p:spPr>
           <a:xfrm>
-            <a:off x="7712397" y="2887216"/>
-            <a:ext cx="708186" cy="285783"/>
+            <a:off x="7411906" y="2887216"/>
+            <a:ext cx="893894" cy="285783"/>
           </a:xfrm>
           <a:prstGeom prst="rect">
             <a:avLst/>
@@ -16283,7 +16009,7 @@
                   <a:srgbClr val="7030A0"/>
                 </a:solidFill>
               </a:rPr>
-              <a:t>Phone</a:t>
+              <a:t>Start time</a:t>
             </a:r>
             <a:endParaRPr lang="en-SG" sz="1050" dirty="0">
               <a:solidFill>
@@ -16295,16 +16021,16 @@
       </p:sp>
       <p:cxnSp>
         <p:nvCxnSpPr>
-          <p:cNvPr id="81" name="Elbow Connector 80"/>
+          <p:cNvPr id="109" name="Elbow Connector 108"/>
           <p:cNvCxnSpPr>
-            <a:stCxn id="78" idx="3"/>
-            <a:endCxn id="80" idx="1"/>
+            <a:stCxn id="105" idx="3"/>
+            <a:endCxn id="108" idx="1"/>
           </p:cNvCxnSpPr>
           <p:nvPr/>
         </p:nvCxnSpPr>
         <p:spPr>
           <a:xfrm flipV="1">
-            <a:off x="7277995" y="3030108"/>
+            <a:off x="6977504" y="3030108"/>
             <a:ext cx="434402" cy="4783"/>
           </a:xfrm>
           <a:prstGeom prst="bentConnector3">
@@ -16336,14 +16062,14 @@
       </p:cxnSp>
       <p:sp>
         <p:nvSpPr>
-          <p:cNvPr id="83" name="Rectangle 8"/>
+          <p:cNvPr id="110" name="Rectangle 8"/>
           <p:cNvSpPr/>
           <p:nvPr/>
         </p:nvSpPr>
         <p:spPr>
           <a:xfrm>
-            <a:off x="7712397" y="3210194"/>
-            <a:ext cx="708186" cy="285783"/>
+            <a:off x="7411906" y="3210194"/>
+            <a:ext cx="893894" cy="285783"/>
           </a:xfrm>
           <a:prstGeom prst="rect">
             <a:avLst/>
@@ -16380,7 +16106,7 @@
                   <a:srgbClr val="7030A0"/>
                 </a:solidFill>
               </a:rPr>
-              <a:t>Email</a:t>
+              <a:t>End time</a:t>
             </a:r>
             <a:endParaRPr lang="en-SG" sz="1050" dirty="0">
               <a:solidFill>
@@ -16392,16 +16118,16 @@
       </p:sp>
       <p:cxnSp>
         <p:nvCxnSpPr>
-          <p:cNvPr id="84" name="Elbow Connector 83"/>
+          <p:cNvPr id="111" name="Elbow Connector 110"/>
           <p:cNvCxnSpPr>
-            <a:stCxn id="78" idx="3"/>
-            <a:endCxn id="83" idx="1"/>
+            <a:stCxn id="105" idx="3"/>
+            <a:endCxn id="110" idx="1"/>
           </p:cNvCxnSpPr>
           <p:nvPr/>
         </p:nvCxnSpPr>
         <p:spPr>
           <a:xfrm>
-            <a:off x="7277995" y="3034891"/>
+            <a:off x="6977504" y="3034891"/>
             <a:ext cx="434402" cy="318195"/>
           </a:xfrm>
           <a:prstGeom prst="bentConnector3">
@@ -16433,14 +16159,14 @@
       </p:cxnSp>
       <p:sp>
         <p:nvSpPr>
-          <p:cNvPr id="85" name="Rectangle 8"/>
+          <p:cNvPr id="112" name="Rectangle 8"/>
           <p:cNvSpPr/>
           <p:nvPr/>
         </p:nvSpPr>
         <p:spPr>
           <a:xfrm>
-            <a:off x="7712397" y="3533171"/>
-            <a:ext cx="708186" cy="285783"/>
+            <a:off x="7411906" y="3533171"/>
+            <a:ext cx="893894" cy="285783"/>
           </a:xfrm>
           <a:prstGeom prst="rect">
             <a:avLst/>
@@ -16477,7 +16203,7 @@
                   <a:srgbClr val="7030A0"/>
                 </a:solidFill>
               </a:rPr>
-              <a:t>Address</a:t>
+              <a:t>Priority</a:t>
             </a:r>
             <a:endParaRPr lang="en-SG" sz="1050" dirty="0">
               <a:solidFill>
@@ -16489,16 +16215,16 @@
       </p:sp>
       <p:cxnSp>
         <p:nvCxnSpPr>
-          <p:cNvPr id="86" name="Elbow Connector 85"/>
+          <p:cNvPr id="113" name="Elbow Connector 112"/>
           <p:cNvCxnSpPr>
-            <a:stCxn id="78" idx="3"/>
-            <a:endCxn id="85" idx="1"/>
+            <a:stCxn id="105" idx="3"/>
+            <a:endCxn id="112" idx="1"/>
           </p:cNvCxnSpPr>
           <p:nvPr/>
         </p:nvCxnSpPr>
         <p:spPr>
           <a:xfrm>
-            <a:off x="7277995" y="3034891"/>
+            <a:off x="6977504" y="3034891"/>
             <a:ext cx="434402" cy="641172"/>
           </a:xfrm>
           <a:prstGeom prst="bentConnector3">
@@ -16530,15 +16256,15 @@
       </p:cxnSp>
       <p:cxnSp>
         <p:nvCxnSpPr>
-          <p:cNvPr id="97" name="Elbow Connector 63"/>
+          <p:cNvPr id="115" name="Elbow Connector 63"/>
           <p:cNvCxnSpPr>
-            <a:stCxn id="99" idx="3"/>
+            <a:stCxn id="116" idx="3"/>
           </p:cNvCxnSpPr>
           <p:nvPr/>
         </p:nvCxnSpPr>
         <p:spPr>
           <a:xfrm rot="16200000" flipH="1">
-            <a:off x="3279321" y="2485431"/>
+            <a:off x="2978830" y="2485431"/>
             <a:ext cx="293825" cy="1"/>
           </a:xfrm>
           <a:prstGeom prst="bentConnector3">
@@ -16573,13 +16299,13 @@
       </p:cxnSp>
       <p:sp>
         <p:nvSpPr>
-          <p:cNvPr id="99" name="Isosceles Triangle 102"/>
+          <p:cNvPr id="116" name="Isosceles Triangle 102"/>
           <p:cNvSpPr/>
           <p:nvPr/>
         </p:nvSpPr>
         <p:spPr>
           <a:xfrm rot="10800000" flipV="1">
-            <a:off x="3290981" y="2162997"/>
+            <a:off x="2990490" y="2162997"/>
             <a:ext cx="270504" cy="175523"/>
           </a:xfrm>
           <a:prstGeom prst="triangle">
@@ -16621,13 +16347,13 @@
       </p:sp>
       <p:sp>
         <p:nvSpPr>
-          <p:cNvPr id="100" name="Rectangle 8"/>
+          <p:cNvPr id="117" name="Rectangle 8"/>
           <p:cNvSpPr/>
           <p:nvPr/>
         </p:nvSpPr>
         <p:spPr>
           <a:xfrm>
-            <a:off x="2660303" y="1806470"/>
+            <a:off x="2359812" y="1806470"/>
             <a:ext cx="1539926" cy="346760"/>
           </a:xfrm>
           <a:prstGeom prst="rect">
@@ -16680,7 +16406,7 @@
                   <a:srgbClr val="7030A0"/>
                 </a:solidFill>
               </a:rPr>
-              <a:t>ReadOnlyAddressBook</a:t>
+              <a:t>ReadOnlyTaskManager</a:t>
             </a:r>
             <a:endParaRPr lang="en-SG" sz="1050" dirty="0">
               <a:solidFill>
@@ -16692,13 +16418,13 @@
       </p:sp>
       <p:sp>
         <p:nvSpPr>
-          <p:cNvPr id="114" name="TextBox 113"/>
+          <p:cNvPr id="121" name="TextBox 120"/>
           <p:cNvSpPr txBox="1"/>
           <p:nvPr/>
         </p:nvSpPr>
         <p:spPr>
           <a:xfrm rot="16200000">
-            <a:off x="6581354" y="3514530"/>
+            <a:off x="6280863" y="3514530"/>
             <a:ext cx="881018" cy="261610"/>
           </a:xfrm>
           <a:prstGeom prst="rect">
@@ -16731,13 +16457,13 @@
       </p:sp>
       <p:sp>
         <p:nvSpPr>
-          <p:cNvPr id="122" name="Rectangle 8"/>
+          <p:cNvPr id="123" name="Rectangle 8"/>
           <p:cNvSpPr/>
           <p:nvPr/>
         </p:nvSpPr>
         <p:spPr>
           <a:xfrm>
-            <a:off x="2057400" y="4239491"/>
+            <a:off x="1756909" y="4239491"/>
             <a:ext cx="1775949" cy="346760"/>
           </a:xfrm>
           <a:prstGeom prst="rect">
@@ -16810,16 +16536,16 @@
       </p:sp>
       <p:cxnSp>
         <p:nvCxnSpPr>
-          <p:cNvPr id="124" name="Elbow Connector 122"/>
+          <p:cNvPr id="125" name="Elbow Connector 122"/>
           <p:cNvCxnSpPr>
-            <a:stCxn id="119" idx="1"/>
-            <a:endCxn id="122" idx="1"/>
+            <a:stCxn id="60" idx="1"/>
+            <a:endCxn id="123" idx="1"/>
           </p:cNvCxnSpPr>
           <p:nvPr/>
         </p:nvCxnSpPr>
         <p:spPr>
           <a:xfrm rot="16200000" flipH="1">
-            <a:off x="1364475" y="3719945"/>
+            <a:off x="1063984" y="3719945"/>
             <a:ext cx="831471" cy="554380"/>
           </a:xfrm>
           <a:prstGeom prst="bentConnector2">
@@ -16830,6 +16556,202 @@
               <a:srgbClr val="7030A0"/>
             </a:solidFill>
             <a:prstDash val="sysDot"/>
+            <a:headEnd type="none" w="med" len="med"/>
+            <a:tailEnd type="arrow" w="med" len="med"/>
+          </a:ln>
+          <a:effectLst/>
+        </p:spPr>
+        <p:style>
+          <a:lnRef idx="1">
+            <a:schemeClr val="accent2"/>
+          </a:lnRef>
+          <a:fillRef idx="2">
+            <a:schemeClr val="accent2"/>
+          </a:fillRef>
+          <a:effectRef idx="1">
+            <a:schemeClr val="accent2"/>
+          </a:effectRef>
+          <a:fontRef idx="minor">
+            <a:schemeClr val="dk1"/>
+          </a:fontRef>
+        </p:style>
+      </p:cxnSp>
+      <p:sp>
+        <p:nvSpPr>
+          <p:cNvPr id="126" name="Rectangle 8"/>
+          <p:cNvSpPr/>
+          <p:nvPr/>
+        </p:nvSpPr>
+        <p:spPr>
+          <a:xfrm>
+            <a:off x="7411906" y="2237501"/>
+            <a:ext cx="893894" cy="285783"/>
+          </a:xfrm>
+          <a:prstGeom prst="rect">
+            <a:avLst/>
+          </a:prstGeom>
+          <a:ln w="19050">
+            <a:solidFill>
+              <a:srgbClr val="7030A0"/>
+            </a:solidFill>
+          </a:ln>
+          <a:effectLst/>
+        </p:spPr>
+        <p:style>
+          <a:lnRef idx="1">
+            <a:schemeClr val="accent4"/>
+          </a:lnRef>
+          <a:fillRef idx="2">
+            <a:schemeClr val="accent4"/>
+          </a:fillRef>
+          <a:effectRef idx="1">
+            <a:schemeClr val="accent4"/>
+          </a:effectRef>
+          <a:fontRef idx="minor">
+            <a:schemeClr val="dk1"/>
+          </a:fontRef>
+        </p:style>
+        <p:txBody>
+          <a:bodyPr rtlCol="0" anchor="ctr"/>
+          <a:lstStyle/>
+          <a:p>
+            <a:pPr algn="ctr"/>
+            <a:r>
+              <a:rPr lang="en-US" sz="1050" dirty="0" err="1" smtClean="0">
+                <a:solidFill>
+                  <a:srgbClr val="7030A0"/>
+                </a:solidFill>
+              </a:rPr>
+              <a:t>Desc</a:t>
+            </a:r>
+            <a:endParaRPr lang="en-SG" sz="1050" dirty="0">
+              <a:solidFill>
+                <a:srgbClr val="7030A0"/>
+              </a:solidFill>
+            </a:endParaRPr>
+          </a:p>
+        </p:txBody>
+      </p:sp>
+      <p:cxnSp>
+        <p:nvCxnSpPr>
+          <p:cNvPr id="127" name="Elbow Connector 126"/>
+          <p:cNvCxnSpPr>
+            <a:stCxn id="105" idx="3"/>
+            <a:endCxn id="126" idx="1"/>
+          </p:cNvCxnSpPr>
+          <p:nvPr/>
+        </p:nvCxnSpPr>
+        <p:spPr>
+          <a:xfrm flipV="1">
+            <a:off x="6977504" y="2380393"/>
+            <a:ext cx="434402" cy="654498"/>
+          </a:xfrm>
+          <a:prstGeom prst="bentConnector3">
+            <a:avLst/>
+          </a:prstGeom>
+          <a:ln w="19050">
+            <a:solidFill>
+              <a:srgbClr val="7030A0"/>
+            </a:solidFill>
+            <a:headEnd type="none" w="med" len="med"/>
+            <a:tailEnd type="arrow" w="med" len="med"/>
+          </a:ln>
+          <a:effectLst/>
+        </p:spPr>
+        <p:style>
+          <a:lnRef idx="1">
+            <a:schemeClr val="accent2"/>
+          </a:lnRef>
+          <a:fillRef idx="2">
+            <a:schemeClr val="accent2"/>
+          </a:fillRef>
+          <a:effectRef idx="1">
+            <a:schemeClr val="accent2"/>
+          </a:effectRef>
+          <a:fontRef idx="minor">
+            <a:schemeClr val="dk1"/>
+          </a:fontRef>
+        </p:style>
+      </p:cxnSp>
+      <p:sp>
+        <p:nvSpPr>
+          <p:cNvPr id="128" name="Rectangle 8"/>
+          <p:cNvSpPr/>
+          <p:nvPr/>
+        </p:nvSpPr>
+        <p:spPr>
+          <a:xfrm>
+            <a:off x="7411906" y="3856148"/>
+            <a:ext cx="893894" cy="285783"/>
+          </a:xfrm>
+          <a:prstGeom prst="rect">
+            <a:avLst/>
+          </a:prstGeom>
+          <a:ln w="19050">
+            <a:solidFill>
+              <a:srgbClr val="7030A0"/>
+            </a:solidFill>
+          </a:ln>
+          <a:effectLst/>
+        </p:spPr>
+        <p:style>
+          <a:lnRef idx="1">
+            <a:schemeClr val="accent4"/>
+          </a:lnRef>
+          <a:fillRef idx="2">
+            <a:schemeClr val="accent4"/>
+          </a:fillRef>
+          <a:effectRef idx="1">
+            <a:schemeClr val="accent4"/>
+          </a:effectRef>
+          <a:fontRef idx="minor">
+            <a:schemeClr val="dk1"/>
+          </a:fontRef>
+        </p:style>
+        <p:txBody>
+          <a:bodyPr rtlCol="0" anchor="ctr"/>
+          <a:lstStyle/>
+          <a:p>
+            <a:pPr algn="ctr"/>
+            <a:r>
+              <a:rPr lang="en-US" sz="1050" dirty="0" smtClean="0">
+                <a:solidFill>
+                  <a:srgbClr val="7030A0"/>
+                </a:solidFill>
+              </a:rPr>
+              <a:t>Done</a:t>
+            </a:r>
+            <a:endParaRPr lang="en-SG" sz="1050" dirty="0">
+              <a:solidFill>
+                <a:srgbClr val="7030A0"/>
+              </a:solidFill>
+            </a:endParaRPr>
+          </a:p>
+        </p:txBody>
+      </p:sp>
+      <p:cxnSp>
+        <p:nvCxnSpPr>
+          <p:cNvPr id="129" name="Elbow Connector 128"/>
+          <p:cNvCxnSpPr>
+            <a:stCxn id="105" idx="3"/>
+            <a:endCxn id="128" idx="1"/>
+          </p:cNvCxnSpPr>
+          <p:nvPr/>
+        </p:nvCxnSpPr>
+        <p:spPr>
+          <a:xfrm>
+            <a:off x="6977504" y="3034891"/>
+            <a:ext cx="434402" cy="964149"/>
+          </a:xfrm>
+          <a:prstGeom prst="bentConnector3">
+            <a:avLst>
+              <a:gd name="adj1" fmla="val 50000"/>
+            </a:avLst>
+          </a:prstGeom>
+          <a:ln w="19050">
+            <a:solidFill>
+              <a:srgbClr val="7030A0"/>
+            </a:solidFill>
             <a:headEnd type="none" w="med" len="med"/>
             <a:tailEnd type="arrow" w="med" len="med"/>
           </a:ln>

</xml_diff>

<commit_message>
Minor changes to diagrams, updated acknowledgements
</commit_message>
<xml_diff>
--- a/docs/diagrams/Diagrams.pptx
+++ b/docs/diagrams/Diagrams.pptx
@@ -182,7 +182,7 @@
             </a:lvl1pPr>
           </a:lstStyle>
           <a:p>
-            <a:endParaRPr lang="en-US"/>
+            <a:endParaRPr lang="en-US" dirty="0"/>
           </a:p>
         </p:txBody>
       </p:sp>
@@ -215,9 +215,9 @@
           <a:p>
             <a:fld id="{F5CC4B3F-88C1-4FFA-B1B6-F41C21DC6924}" type="datetimeFigureOut">
               <a:rPr lang="en-US" smtClean="0"/>
-              <a:t>11/6/2016</a:t>
+              <a:t>11/6/16</a:t>
             </a:fld>
-            <a:endParaRPr lang="en-US"/>
+            <a:endParaRPr lang="en-US" dirty="0"/>
           </a:p>
         </p:txBody>
       </p:sp>
@@ -250,7 +250,7 @@
           <a:bodyPr vert="horz" lIns="91440" tIns="45720" rIns="91440" bIns="45720" rtlCol="0" anchor="ctr"/>
           <a:lstStyle/>
           <a:p>
-            <a:endParaRPr lang="en-US"/>
+            <a:endParaRPr lang="en-US" dirty="0"/>
           </a:p>
         </p:txBody>
       </p:sp>
@@ -341,7 +341,7 @@
             </a:lvl1pPr>
           </a:lstStyle>
           <a:p>
-            <a:endParaRPr lang="en-US"/>
+            <a:endParaRPr lang="en-US" dirty="0"/>
           </a:p>
         </p:txBody>
       </p:sp>
@@ -376,7 +376,7 @@
               <a:rPr lang="en-US" smtClean="0"/>
               <a:t>‹#›</a:t>
             </a:fld>
-            <a:endParaRPr lang="en-US"/>
+            <a:endParaRPr lang="en-US" dirty="0"/>
           </a:p>
         </p:txBody>
       </p:sp>
@@ -664,9 +664,9 @@
           <a:p>
             <a:fld id="{78C97017-6FC3-485B-9764-EAC9E56C1D49}" type="datetimeFigureOut">
               <a:rPr lang="en-US" smtClean="0"/>
-              <a:t>11/6/2016</a:t>
+              <a:t>11/6/16</a:t>
             </a:fld>
-            <a:endParaRPr lang="en-US"/>
+            <a:endParaRPr lang="en-US" dirty="0"/>
           </a:p>
         </p:txBody>
       </p:sp>
@@ -685,7 +685,7 @@
           <a:bodyPr/>
           <a:lstStyle/>
           <a:p>
-            <a:endParaRPr lang="en-US"/>
+            <a:endParaRPr lang="en-US" dirty="0"/>
           </a:p>
         </p:txBody>
       </p:sp>
@@ -708,7 +708,7 @@
               <a:rPr lang="en-US" smtClean="0"/>
               <a:t>‹#›</a:t>
             </a:fld>
-            <a:endParaRPr lang="en-US"/>
+            <a:endParaRPr lang="en-US" dirty="0"/>
           </a:p>
         </p:txBody>
       </p:sp>
@@ -834,9 +834,9 @@
           <a:p>
             <a:fld id="{78C97017-6FC3-485B-9764-EAC9E56C1D49}" type="datetimeFigureOut">
               <a:rPr lang="en-US" smtClean="0"/>
-              <a:t>11/6/2016</a:t>
+              <a:t>11/6/16</a:t>
             </a:fld>
-            <a:endParaRPr lang="en-US"/>
+            <a:endParaRPr lang="en-US" dirty="0"/>
           </a:p>
         </p:txBody>
       </p:sp>
@@ -855,7 +855,7 @@
           <a:bodyPr/>
           <a:lstStyle/>
           <a:p>
-            <a:endParaRPr lang="en-US"/>
+            <a:endParaRPr lang="en-US" dirty="0"/>
           </a:p>
         </p:txBody>
       </p:sp>
@@ -878,7 +878,7 @@
               <a:rPr lang="en-US" smtClean="0"/>
               <a:t>‹#›</a:t>
             </a:fld>
-            <a:endParaRPr lang="en-US"/>
+            <a:endParaRPr lang="en-US" dirty="0"/>
           </a:p>
         </p:txBody>
       </p:sp>
@@ -1014,9 +1014,9 @@
           <a:p>
             <a:fld id="{78C97017-6FC3-485B-9764-EAC9E56C1D49}" type="datetimeFigureOut">
               <a:rPr lang="en-US" smtClean="0"/>
-              <a:t>11/6/2016</a:t>
+              <a:t>11/6/16</a:t>
             </a:fld>
-            <a:endParaRPr lang="en-US"/>
+            <a:endParaRPr lang="en-US" dirty="0"/>
           </a:p>
         </p:txBody>
       </p:sp>
@@ -1035,7 +1035,7 @@
           <a:bodyPr/>
           <a:lstStyle/>
           <a:p>
-            <a:endParaRPr lang="en-US"/>
+            <a:endParaRPr lang="en-US" dirty="0"/>
           </a:p>
         </p:txBody>
       </p:sp>
@@ -1058,7 +1058,7 @@
               <a:rPr lang="en-US" smtClean="0"/>
               <a:t>‹#›</a:t>
             </a:fld>
-            <a:endParaRPr lang="en-US"/>
+            <a:endParaRPr lang="en-US" dirty="0"/>
           </a:p>
         </p:txBody>
       </p:sp>
@@ -1184,9 +1184,9 @@
           <a:p>
             <a:fld id="{78C97017-6FC3-485B-9764-EAC9E56C1D49}" type="datetimeFigureOut">
               <a:rPr lang="en-US" smtClean="0"/>
-              <a:t>11/6/2016</a:t>
+              <a:t>11/6/16</a:t>
             </a:fld>
-            <a:endParaRPr lang="en-US"/>
+            <a:endParaRPr lang="en-US" dirty="0"/>
           </a:p>
         </p:txBody>
       </p:sp>
@@ -1205,7 +1205,7 @@
           <a:bodyPr/>
           <a:lstStyle/>
           <a:p>
-            <a:endParaRPr lang="en-US"/>
+            <a:endParaRPr lang="en-US" dirty="0"/>
           </a:p>
         </p:txBody>
       </p:sp>
@@ -1228,7 +1228,7 @@
               <a:rPr lang="en-US" smtClean="0"/>
               <a:t>‹#›</a:t>
             </a:fld>
-            <a:endParaRPr lang="en-US"/>
+            <a:endParaRPr lang="en-US" dirty="0"/>
           </a:p>
         </p:txBody>
       </p:sp>
@@ -1430,9 +1430,9 @@
           <a:p>
             <a:fld id="{78C97017-6FC3-485B-9764-EAC9E56C1D49}" type="datetimeFigureOut">
               <a:rPr lang="en-US" smtClean="0"/>
-              <a:t>11/6/2016</a:t>
+              <a:t>11/6/16</a:t>
             </a:fld>
-            <a:endParaRPr lang="en-US"/>
+            <a:endParaRPr lang="en-US" dirty="0"/>
           </a:p>
         </p:txBody>
       </p:sp>
@@ -1451,7 +1451,7 @@
           <a:bodyPr/>
           <a:lstStyle/>
           <a:p>
-            <a:endParaRPr lang="en-US"/>
+            <a:endParaRPr lang="en-US" dirty="0"/>
           </a:p>
         </p:txBody>
       </p:sp>
@@ -1474,7 +1474,7 @@
               <a:rPr lang="en-US" smtClean="0"/>
               <a:t>‹#›</a:t>
             </a:fld>
-            <a:endParaRPr lang="en-US"/>
+            <a:endParaRPr lang="en-US" dirty="0"/>
           </a:p>
         </p:txBody>
       </p:sp>
@@ -1718,9 +1718,9 @@
           <a:p>
             <a:fld id="{78C97017-6FC3-485B-9764-EAC9E56C1D49}" type="datetimeFigureOut">
               <a:rPr lang="en-US" smtClean="0"/>
-              <a:t>11/6/2016</a:t>
+              <a:t>11/6/16</a:t>
             </a:fld>
-            <a:endParaRPr lang="en-US"/>
+            <a:endParaRPr lang="en-US" dirty="0"/>
           </a:p>
         </p:txBody>
       </p:sp>
@@ -1739,7 +1739,7 @@
           <a:bodyPr/>
           <a:lstStyle/>
           <a:p>
-            <a:endParaRPr lang="en-US"/>
+            <a:endParaRPr lang="en-US" dirty="0"/>
           </a:p>
         </p:txBody>
       </p:sp>
@@ -1762,7 +1762,7 @@
               <a:rPr lang="en-US" smtClean="0"/>
               <a:t>‹#›</a:t>
             </a:fld>
-            <a:endParaRPr lang="en-US"/>
+            <a:endParaRPr lang="en-US" dirty="0"/>
           </a:p>
         </p:txBody>
       </p:sp>
@@ -2140,9 +2140,9 @@
           <a:p>
             <a:fld id="{78C97017-6FC3-485B-9764-EAC9E56C1D49}" type="datetimeFigureOut">
               <a:rPr lang="en-US" smtClean="0"/>
-              <a:t>11/6/2016</a:t>
+              <a:t>11/6/16</a:t>
             </a:fld>
-            <a:endParaRPr lang="en-US"/>
+            <a:endParaRPr lang="en-US" dirty="0"/>
           </a:p>
         </p:txBody>
       </p:sp>
@@ -2161,7 +2161,7 @@
           <a:bodyPr/>
           <a:lstStyle/>
           <a:p>
-            <a:endParaRPr lang="en-US"/>
+            <a:endParaRPr lang="en-US" dirty="0"/>
           </a:p>
         </p:txBody>
       </p:sp>
@@ -2184,7 +2184,7 @@
               <a:rPr lang="en-US" smtClean="0"/>
               <a:t>‹#›</a:t>
             </a:fld>
-            <a:endParaRPr lang="en-US"/>
+            <a:endParaRPr lang="en-US" dirty="0"/>
           </a:p>
         </p:txBody>
       </p:sp>
@@ -2258,9 +2258,9 @@
           <a:p>
             <a:fld id="{78C97017-6FC3-485B-9764-EAC9E56C1D49}" type="datetimeFigureOut">
               <a:rPr lang="en-US" smtClean="0"/>
-              <a:t>11/6/2016</a:t>
+              <a:t>11/6/16</a:t>
             </a:fld>
-            <a:endParaRPr lang="en-US"/>
+            <a:endParaRPr lang="en-US" dirty="0"/>
           </a:p>
         </p:txBody>
       </p:sp>
@@ -2279,7 +2279,7 @@
           <a:bodyPr/>
           <a:lstStyle/>
           <a:p>
-            <a:endParaRPr lang="en-US"/>
+            <a:endParaRPr lang="en-US" dirty="0"/>
           </a:p>
         </p:txBody>
       </p:sp>
@@ -2302,7 +2302,7 @@
               <a:rPr lang="en-US" smtClean="0"/>
               <a:t>‹#›</a:t>
             </a:fld>
-            <a:endParaRPr lang="en-US"/>
+            <a:endParaRPr lang="en-US" dirty="0"/>
           </a:p>
         </p:txBody>
       </p:sp>
@@ -2353,9 +2353,9 @@
           <a:p>
             <a:fld id="{78C97017-6FC3-485B-9764-EAC9E56C1D49}" type="datetimeFigureOut">
               <a:rPr lang="en-US" smtClean="0"/>
-              <a:t>11/6/2016</a:t>
+              <a:t>11/6/16</a:t>
             </a:fld>
-            <a:endParaRPr lang="en-US"/>
+            <a:endParaRPr lang="en-US" dirty="0"/>
           </a:p>
         </p:txBody>
       </p:sp>
@@ -2374,7 +2374,7 @@
           <a:bodyPr/>
           <a:lstStyle/>
           <a:p>
-            <a:endParaRPr lang="en-US"/>
+            <a:endParaRPr lang="en-US" dirty="0"/>
           </a:p>
         </p:txBody>
       </p:sp>
@@ -2397,7 +2397,7 @@
               <a:rPr lang="en-US" smtClean="0"/>
               <a:t>‹#›</a:t>
             </a:fld>
-            <a:endParaRPr lang="en-US"/>
+            <a:endParaRPr lang="en-US" dirty="0"/>
           </a:p>
         </p:txBody>
       </p:sp>
@@ -2630,9 +2630,9 @@
           <a:p>
             <a:fld id="{78C97017-6FC3-485B-9764-EAC9E56C1D49}" type="datetimeFigureOut">
               <a:rPr lang="en-US" smtClean="0"/>
-              <a:t>11/6/2016</a:t>
+              <a:t>11/6/16</a:t>
             </a:fld>
-            <a:endParaRPr lang="en-US"/>
+            <a:endParaRPr lang="en-US" dirty="0"/>
           </a:p>
         </p:txBody>
       </p:sp>
@@ -2651,7 +2651,7 @@
           <a:bodyPr/>
           <a:lstStyle/>
           <a:p>
-            <a:endParaRPr lang="en-US"/>
+            <a:endParaRPr lang="en-US" dirty="0"/>
           </a:p>
         </p:txBody>
       </p:sp>
@@ -2674,7 +2674,7 @@
               <a:rPr lang="en-US" smtClean="0"/>
               <a:t>‹#›</a:t>
             </a:fld>
-            <a:endParaRPr lang="en-US"/>
+            <a:endParaRPr lang="en-US" dirty="0"/>
           </a:p>
         </p:txBody>
       </p:sp>
@@ -2797,7 +2797,7 @@
             </a:lvl9pPr>
           </a:lstStyle>
           <a:p>
-            <a:endParaRPr lang="en-US"/>
+            <a:endParaRPr lang="en-US" dirty="0"/>
           </a:p>
         </p:txBody>
       </p:sp>
@@ -2883,9 +2883,9 @@
           <a:p>
             <a:fld id="{78C97017-6FC3-485B-9764-EAC9E56C1D49}" type="datetimeFigureOut">
               <a:rPr lang="en-US" smtClean="0"/>
-              <a:t>11/6/2016</a:t>
+              <a:t>11/6/16</a:t>
             </a:fld>
-            <a:endParaRPr lang="en-US"/>
+            <a:endParaRPr lang="en-US" dirty="0"/>
           </a:p>
         </p:txBody>
       </p:sp>
@@ -2904,7 +2904,7 @@
           <a:bodyPr/>
           <a:lstStyle/>
           <a:p>
-            <a:endParaRPr lang="en-US"/>
+            <a:endParaRPr lang="en-US" dirty="0"/>
           </a:p>
         </p:txBody>
       </p:sp>
@@ -2927,7 +2927,7 @@
               <a:rPr lang="en-US" smtClean="0"/>
               <a:t>‹#›</a:t>
             </a:fld>
-            <a:endParaRPr lang="en-US"/>
+            <a:endParaRPr lang="en-US" dirty="0"/>
           </a:p>
         </p:txBody>
       </p:sp>
@@ -3096,9 +3096,9 @@
           <a:p>
             <a:fld id="{78C97017-6FC3-485B-9764-EAC9E56C1D49}" type="datetimeFigureOut">
               <a:rPr lang="en-US" smtClean="0"/>
-              <a:t>11/6/2016</a:t>
+              <a:t>11/6/16</a:t>
             </a:fld>
-            <a:endParaRPr lang="en-US"/>
+            <a:endParaRPr lang="en-US" dirty="0"/>
           </a:p>
         </p:txBody>
       </p:sp>
@@ -3135,7 +3135,7 @@
             </a:lvl1pPr>
           </a:lstStyle>
           <a:p>
-            <a:endParaRPr lang="en-US"/>
+            <a:endParaRPr lang="en-US" dirty="0"/>
           </a:p>
         </p:txBody>
       </p:sp>
@@ -3176,7 +3176,7 @@
               <a:rPr lang="en-US" smtClean="0"/>
               <a:t>‹#›</a:t>
             </a:fld>
-            <a:endParaRPr lang="en-US"/>
+            <a:endParaRPr lang="en-US" dirty="0"/>
           </a:p>
         </p:txBody>
       </p:sp>
@@ -3487,7 +3487,7 @@
           <a:lstStyle/>
           <a:p>
             <a:r>
-              <a:rPr lang="en-US" dirty="0" err="1" smtClean="0"/>
+              <a:rPr lang="en-US" dirty="0" smtClean="0"/>
               <a:t>TaskNinja</a:t>
             </a:r>
             <a:endParaRPr lang="en-US" dirty="0"/>
@@ -3597,7 +3597,7 @@
           <a:lstStyle/>
           <a:p>
             <a:pPr algn="ctr"/>
-            <a:endParaRPr lang="en-US"/>
+            <a:endParaRPr lang="en-US" dirty="0"/>
           </a:p>
         </p:txBody>
       </p:sp>
@@ -4097,7 +4097,7 @@
           <a:lstStyle/>
           <a:p>
             <a:pPr algn="ctr"/>
-            <a:endParaRPr lang="en-US"/>
+            <a:endParaRPr lang="en-US" dirty="0"/>
           </a:p>
         </p:txBody>
       </p:sp>
@@ -4221,7 +4221,7 @@
           <a:lstStyle/>
           <a:p>
             <a:pPr algn="ctr"/>
-            <a:endParaRPr lang="en-US"/>
+            <a:endParaRPr lang="en-US" dirty="0"/>
           </a:p>
         </p:txBody>
       </p:sp>
@@ -4269,7 +4269,7 @@
           <a:lstStyle/>
           <a:p>
             <a:pPr algn="ctr"/>
-            <a:endParaRPr lang="en-US"/>
+            <a:endParaRPr lang="en-US" dirty="0"/>
           </a:p>
         </p:txBody>
       </p:sp>
@@ -4946,7 +4946,7 @@
           <a:lstStyle/>
           <a:p>
             <a:pPr algn="ctr"/>
-            <a:endParaRPr lang="en-SG" sz="1400">
+            <a:endParaRPr lang="en-SG" sz="1400" dirty="0">
               <a:solidFill>
                 <a:schemeClr val="dk1"/>
               </a:solidFill>
@@ -5013,7 +5013,7 @@
             <a:lstStyle/>
             <a:p>
               <a:pPr algn="ctr"/>
-              <a:endParaRPr lang="en-SG"/>
+              <a:endParaRPr lang="en-SG" dirty="0"/>
             </a:p>
           </p:txBody>
         </p:sp>
@@ -5130,7 +5130,7 @@
             <a:lstStyle/>
             <a:p>
               <a:pPr algn="ctr"/>
-              <a:endParaRPr lang="en-SG"/>
+              <a:endParaRPr lang="en-SG" dirty="0"/>
             </a:p>
           </p:txBody>
         </p:sp>
@@ -5310,7 +5310,7 @@
           <a:lstStyle/>
           <a:p>
             <a:pPr algn="ctr"/>
-            <a:endParaRPr lang="en-SG" sz="1400">
+            <a:endParaRPr lang="en-SG" sz="1400" dirty="0">
               <a:solidFill>
                 <a:schemeClr val="dk1"/>
               </a:solidFill>
@@ -5457,7 +5457,7 @@
           <a:lstStyle/>
           <a:p>
             <a:pPr algn="ctr"/>
-            <a:endParaRPr lang="en-SG" sz="1400">
+            <a:endParaRPr lang="en-SG" sz="1400" dirty="0">
               <a:solidFill>
                 <a:schemeClr val="dk1"/>
               </a:solidFill>
@@ -5664,20 +5664,12 @@
           <a:lstStyle/>
           <a:p>
             <a:r>
-              <a:rPr lang="en-US" sz="1400" dirty="0" err="1" smtClean="0">
-                <a:solidFill>
-                  <a:srgbClr val="7030A0"/>
-                </a:solidFill>
-              </a:rPr>
-              <a:t>deleteTask</a:t>
-            </a:r>
-            <a:r>
               <a:rPr lang="en-US" sz="1400" dirty="0" smtClean="0">
                 <a:solidFill>
                   <a:srgbClr val="7030A0"/>
                 </a:solidFill>
               </a:rPr>
-              <a:t>(t)</a:t>
+              <a:t>deleteTask(t)</a:t>
             </a:r>
             <a:endParaRPr lang="en-US" sz="1400" dirty="0">
               <a:solidFill>
@@ -5717,27 +5709,7 @@
                   </a:schemeClr>
                 </a:solidFill>
               </a:rPr>
-              <a:t>post(</a:t>
-            </a:r>
-            <a:r>
-              <a:rPr lang="en-US" sz="1400" dirty="0" err="1" smtClean="0">
-                <a:solidFill>
-                  <a:schemeClr val="accent5">
-                    <a:lumMod val="75000"/>
-                  </a:schemeClr>
-                </a:solidFill>
-              </a:rPr>
-              <a:t>TaskManagerChangedEvent</a:t>
-            </a:r>
-            <a:r>
-              <a:rPr lang="en-US" sz="1400" dirty="0" smtClean="0">
-                <a:solidFill>
-                  <a:schemeClr val="accent5">
-                    <a:lumMod val="75000"/>
-                  </a:schemeClr>
-                </a:solidFill>
-              </a:rPr>
-              <a:t>)</a:t>
+              <a:t>post(TaskManagerChangedEvent)</a:t>
             </a:r>
             <a:endParaRPr lang="en-US" sz="1400" dirty="0">
               <a:solidFill>
@@ -5916,15 +5888,7 @@
                   <a:schemeClr val="bg1"/>
                 </a:solidFill>
               </a:rPr>
-              <a:t>:</a:t>
-            </a:r>
-            <a:r>
-              <a:rPr lang="en-US" sz="1600" dirty="0" err="1" smtClean="0">
-                <a:solidFill>
-                  <a:schemeClr val="bg1"/>
-                </a:solidFill>
-              </a:rPr>
-              <a:t>EventsCenter</a:t>
+              <a:t>:EventsCenter</a:t>
             </a:r>
             <a:endParaRPr lang="en-SG" sz="1600" dirty="0">
               <a:solidFill>
@@ -6020,7 +5984,7 @@
           <a:lstStyle/>
           <a:p>
             <a:pPr algn="ctr"/>
-            <a:endParaRPr lang="en-SG" sz="1400">
+            <a:endParaRPr lang="en-SG" sz="1400" dirty="0">
               <a:solidFill>
                 <a:schemeClr val="dk1"/>
               </a:solidFill>
@@ -6253,7 +6217,7 @@
           <a:lstStyle/>
           <a:p>
             <a:pPr algn="ctr"/>
-            <a:endParaRPr lang="en-SG" sz="1400">
+            <a:endParaRPr lang="en-SG" sz="1400" dirty="0">
               <a:solidFill>
                 <a:schemeClr val="dk1"/>
               </a:solidFill>
@@ -6291,27 +6255,7 @@
                   </a:schemeClr>
                 </a:solidFill>
               </a:rPr>
-              <a:t>post(</a:t>
-            </a:r>
-            <a:r>
-              <a:rPr lang="en-US" sz="1400" dirty="0" err="1" smtClean="0">
-                <a:solidFill>
-                  <a:schemeClr val="accent5">
-                    <a:lumMod val="75000"/>
-                  </a:schemeClr>
-                </a:solidFill>
-              </a:rPr>
-              <a:t>TaskManagerChangedEvent</a:t>
-            </a:r>
-            <a:r>
-              <a:rPr lang="en-US" sz="1400" dirty="0" smtClean="0">
-                <a:solidFill>
-                  <a:schemeClr val="accent5">
-                    <a:lumMod val="75000"/>
-                  </a:schemeClr>
-                </a:solidFill>
-              </a:rPr>
-              <a:t>)</a:t>
+              <a:t>post(TaskManagerChangedEvent)</a:t>
             </a:r>
             <a:endParaRPr lang="en-US" sz="1400" dirty="0">
               <a:solidFill>
@@ -6416,15 +6360,7 @@
                   <a:schemeClr val="bg1"/>
                 </a:solidFill>
               </a:rPr>
-              <a:t>:</a:t>
-            </a:r>
-            <a:r>
-              <a:rPr lang="en-US" sz="1600" dirty="0" err="1" smtClean="0">
-                <a:solidFill>
-                  <a:schemeClr val="bg1"/>
-                </a:solidFill>
-              </a:rPr>
-              <a:t>EventsCenter</a:t>
+              <a:t>:EventsCenter</a:t>
             </a:r>
             <a:endParaRPr lang="en-SG" sz="1600" dirty="0">
               <a:solidFill>
@@ -6520,7 +6456,7 @@
           <a:lstStyle/>
           <a:p>
             <a:pPr algn="ctr"/>
-            <a:endParaRPr lang="en-SG" sz="1400">
+            <a:endParaRPr lang="en-SG" sz="1400" dirty="0">
               <a:solidFill>
                 <a:schemeClr val="dk1"/>
               </a:solidFill>
@@ -6665,16 +6601,6 @@
           </a:bodyPr>
           <a:lstStyle/>
           <a:p>
-            <a:r>
-              <a:rPr lang="en-US" sz="1400" dirty="0" err="1" smtClean="0">
-                <a:solidFill>
-                  <a:schemeClr val="accent6">
-                    <a:lumMod val="75000"/>
-                  </a:schemeClr>
-                </a:solidFill>
-              </a:rPr>
-              <a:t>handleTaskManagerChangedEvent</a:t>
-            </a:r>
             <a:r>
               <a:rPr lang="en-US" sz="1400" dirty="0" smtClean="0">
                 <a:solidFill>
@@ -6683,7 +6609,7 @@
                   </a:schemeClr>
                 </a:solidFill>
               </a:rPr>
-              <a:t>()</a:t>
+              <a:t>handleTaskManagerChangedEvent()</a:t>
             </a:r>
             <a:endParaRPr lang="en-US" sz="1400" dirty="0">
               <a:solidFill>
@@ -6871,7 +6797,7 @@
           <a:lstStyle/>
           <a:p>
             <a:pPr algn="ctr"/>
-            <a:endParaRPr lang="en-SG" sz="1400">
+            <a:endParaRPr lang="en-SG" sz="1400" dirty="0">
               <a:solidFill>
                 <a:schemeClr val="dk1"/>
               </a:solidFill>
@@ -6978,21 +6904,13 @@
           </a:bodyPr>
           <a:lstStyle/>
           <a:p>
-            <a:r>
-              <a:rPr lang="en-US" sz="1400" dirty="0" err="1" smtClean="0">
-                <a:solidFill>
-                  <a:srgbClr val="00B050"/>
-                </a:solidFill>
-              </a:rPr>
-              <a:t>handleTaskManagerChangedEvent</a:t>
-            </a:r>
             <a:r>
               <a:rPr lang="en-US" sz="1400" dirty="0" smtClean="0">
                 <a:solidFill>
                   <a:srgbClr val="00B050"/>
                 </a:solidFill>
               </a:rPr>
-              <a:t>()</a:t>
+              <a:t>handleTaskManagerChangedEvent()</a:t>
             </a:r>
             <a:endParaRPr lang="en-US" sz="1400" dirty="0">
               <a:solidFill>
@@ -7105,7 +7023,7 @@
             <a:lstStyle/>
             <a:p>
               <a:pPr algn="ctr"/>
-              <a:endParaRPr lang="en-SG"/>
+              <a:endParaRPr lang="en-SG" dirty="0"/>
             </a:p>
           </p:txBody>
         </p:sp>
@@ -7152,7 +7070,7 @@
             <a:lstStyle/>
             <a:p>
               <a:pPr algn="ctr"/>
-              <a:endParaRPr lang="en-SG" sz="1400">
+              <a:endParaRPr lang="en-SG" sz="1400" dirty="0">
                 <a:solidFill>
                   <a:schemeClr val="dk1"/>
                 </a:solidFill>
@@ -7305,7 +7223,7 @@
             <a:lstStyle/>
             <a:p>
               <a:pPr algn="ctr"/>
-              <a:endParaRPr lang="en-SG"/>
+              <a:endParaRPr lang="en-SG" dirty="0"/>
             </a:p>
           </p:txBody>
         </p:sp>
@@ -7354,7 +7272,7 @@
             <a:lstStyle/>
             <a:p>
               <a:pPr algn="ctr"/>
-              <a:endParaRPr lang="en-SG" sz="1400">
+              <a:endParaRPr lang="en-SG" sz="1400" dirty="0">
                 <a:solidFill>
                   <a:schemeClr val="dk1"/>
                 </a:solidFill>
@@ -7463,7 +7381,7 @@
         <p:spPr>
           <a:xfrm>
             <a:off x="1217465" y="1447800"/>
-            <a:ext cx="4917083" cy="3962400"/>
+            <a:ext cx="4917083" cy="4249830"/>
           </a:xfrm>
           <a:prstGeom prst="roundRect">
             <a:avLst>
@@ -7557,7 +7475,7 @@
           <a:p>
             <a:pPr algn="ctr"/>
             <a:r>
-              <a:rPr lang="en-US" sz="1050" b="1" dirty="0" err="1">
+              <a:rPr lang="en-US" sz="1050" b="1" dirty="0">
                 <a:solidFill>
                   <a:schemeClr val="accent3">
                     <a:lumMod val="75000"/>
@@ -7617,7 +7535,7 @@
           <a:p>
             <a:pPr algn="ctr"/>
             <a:r>
-              <a:rPr lang="en-US" sz="1050" b="1" dirty="0" err="1">
+              <a:rPr lang="en-US" sz="1050" b="1" dirty="0">
                 <a:solidFill>
                   <a:schemeClr val="accent3">
                     <a:lumMod val="75000"/>
@@ -7680,7 +7598,7 @@
           <a:p>
             <a:pPr algn="ctr"/>
             <a:r>
-              <a:rPr lang="en-US" sz="1050" dirty="0" err="1" smtClean="0">
+              <a:rPr lang="en-US" sz="1050" dirty="0" smtClean="0">
                 <a:solidFill>
                   <a:schemeClr val="bg1"/>
                 </a:solidFill>
@@ -7778,7 +7696,7 @@
           <a:lstStyle/>
           <a:p>
             <a:pPr algn="ctr"/>
-            <a:endParaRPr lang="en-SG" sz="1050" b="1">
+            <a:endParaRPr lang="en-SG" sz="1050" b="1" dirty="0">
               <a:solidFill>
                 <a:srgbClr val="92D050"/>
               </a:solidFill>
@@ -7897,7 +7815,7 @@
         </p:nvSpPr>
         <p:spPr>
           <a:xfrm>
-            <a:off x="2592527" y="4563759"/>
+            <a:off x="2626517" y="4910926"/>
             <a:ext cx="1093635" cy="236841"/>
           </a:xfrm>
           <a:prstGeom prst="rect">
@@ -7930,7 +7848,7 @@
           <a:p>
             <a:pPr algn="ctr"/>
             <a:r>
-              <a:rPr lang="en-US" sz="1050" b="1" dirty="0" err="1">
+              <a:rPr lang="en-US" sz="1050" b="1" dirty="0">
                 <a:solidFill>
                   <a:schemeClr val="accent3">
                     <a:lumMod val="75000"/>
@@ -7957,7 +7875,7 @@
         </p:nvSpPr>
         <p:spPr>
           <a:xfrm>
-            <a:off x="2592526" y="3991960"/>
+            <a:off x="2632303" y="4328724"/>
             <a:ext cx="1093635" cy="236841"/>
           </a:xfrm>
           <a:prstGeom prst="rect">
@@ -7990,7 +7908,7 @@
           <a:p>
             <a:pPr algn="ctr"/>
             <a:r>
-              <a:rPr lang="en-US" sz="1050" b="1" dirty="0" err="1" smtClean="0">
+              <a:rPr lang="en-US" sz="1050" b="1" dirty="0" smtClean="0">
                 <a:solidFill>
                   <a:schemeClr val="accent3">
                     <a:lumMod val="75000"/>
@@ -8017,7 +7935,7 @@
         </p:nvSpPr>
         <p:spPr>
           <a:xfrm>
-            <a:off x="3839323" y="4228801"/>
+            <a:off x="3879100" y="4565565"/>
             <a:ext cx="1040906" cy="236841"/>
           </a:xfrm>
           <a:prstGeom prst="rect">
@@ -8050,7 +7968,7 @@
           <a:p>
             <a:pPr algn="ctr"/>
             <a:r>
-              <a:rPr lang="en-US" sz="1050" b="1" dirty="0" err="1" smtClean="0">
+              <a:rPr lang="en-US" sz="1050" b="1" dirty="0" smtClean="0">
                 <a:solidFill>
                   <a:schemeClr val="accent3">
                     <a:lumMod val="75000"/>
@@ -8077,7 +7995,7 @@
         </p:nvSpPr>
         <p:spPr>
           <a:xfrm>
-            <a:off x="2592528" y="4966000"/>
+            <a:off x="2846761" y="5261461"/>
             <a:ext cx="1093635" cy="236841"/>
           </a:xfrm>
           <a:prstGeom prst="rect">
@@ -8110,7 +8028,7 @@
           <a:p>
             <a:pPr algn="ctr"/>
             <a:r>
-              <a:rPr lang="en-US" sz="1050" b="1" dirty="0" err="1">
+              <a:rPr lang="en-US" sz="1050" b="1" dirty="0">
                 <a:solidFill>
                   <a:schemeClr val="accent3">
                     <a:lumMod val="75000"/>
@@ -8173,7 +8091,7 @@
           <a:lstStyle/>
           <a:p>
             <a:pPr algn="ctr"/>
-            <a:endParaRPr lang="en-SG"/>
+            <a:endParaRPr lang="en-SG" dirty="0"/>
           </a:p>
         </p:txBody>
       </p:sp>
@@ -8259,7 +8177,7 @@
           <a:p>
             <a:pPr algn="ctr"/>
             <a:r>
-              <a:rPr lang="en-US" sz="1050" b="1" dirty="0" err="1">
+              <a:rPr lang="en-US" sz="1050" b="1" dirty="0">
                 <a:solidFill>
                   <a:schemeClr val="accent3">
                     <a:lumMod val="75000"/>
@@ -8289,8 +8207,8 @@
         </p:nvCxnSpPr>
         <p:spPr>
           <a:xfrm rot="16200000" flipH="1">
-            <a:off x="1883148" y="3401003"/>
-            <a:ext cx="1242356" cy="176400"/>
+            <a:off x="1734654" y="3549496"/>
+            <a:ext cx="1579120" cy="216177"/>
           </a:xfrm>
           <a:prstGeom prst="bentConnector2">
             <a:avLst/>
@@ -8330,8 +8248,8 @@
         </p:nvCxnSpPr>
         <p:spPr>
           <a:xfrm rot="16200000" flipH="1">
-            <a:off x="1597249" y="3686901"/>
-            <a:ext cx="1814155" cy="176401"/>
+            <a:off x="1440660" y="3843490"/>
+            <a:ext cx="2161322" cy="210391"/>
           </a:xfrm>
           <a:prstGeom prst="bentConnector2">
             <a:avLst/>
@@ -8364,14 +8282,15 @@
         <p:nvCxnSpPr>
           <p:cNvPr id="53" name="Elbow Connector 63"/>
           <p:cNvCxnSpPr>
+            <a:stCxn id="39" idx="2"/>
             <a:endCxn id="38" idx="1"/>
           </p:cNvCxnSpPr>
           <p:nvPr/>
         </p:nvCxnSpPr>
         <p:spPr>
           <a:xfrm rot="16200000" flipH="1">
-            <a:off x="1184119" y="3676012"/>
-            <a:ext cx="2396440" cy="420377"/>
+            <a:off x="1375515" y="3908635"/>
+            <a:ext cx="2511857" cy="430635"/>
           </a:xfrm>
           <a:prstGeom prst="bentConnector2">
             <a:avLst/>
@@ -8460,7 +8379,7 @@
               </a:rPr>
             </a:br>
             <a:r>
-              <a:rPr lang="en-US" sz="1050" b="1" dirty="0" err="1" smtClean="0">
+              <a:rPr lang="en-US" sz="1050" b="1" dirty="0" smtClean="0">
                 <a:solidFill>
                   <a:schemeClr val="accent3">
                     <a:lumMod val="75000"/>
@@ -8531,8 +8450,8 @@
         </p:nvCxnSpPr>
         <p:spPr>
           <a:xfrm rot="5400000">
-            <a:off x="4174488" y="2991741"/>
-            <a:ext cx="2061222" cy="649740"/>
+            <a:off x="4025995" y="3180012"/>
+            <a:ext cx="2397986" cy="609963"/>
           </a:xfrm>
           <a:prstGeom prst="bentConnector2">
             <a:avLst/>
@@ -8613,8 +8532,8 @@
         </p:nvCxnSpPr>
         <p:spPr>
           <a:xfrm rot="5400000">
-            <a:off x="3409976" y="2562187"/>
-            <a:ext cx="2396180" cy="1843807"/>
+            <a:off x="3253388" y="2752765"/>
+            <a:ext cx="2743347" cy="1809817"/>
           </a:xfrm>
           <a:prstGeom prst="bentConnector2">
             <a:avLst/>
@@ -8654,8 +8573,8 @@
         </p:nvCxnSpPr>
         <p:spPr>
           <a:xfrm rot="5400000">
-            <a:off x="3208856" y="2763307"/>
-            <a:ext cx="2798421" cy="1843806"/>
+            <a:off x="3188242" y="3038155"/>
+            <a:ext cx="3093882" cy="1589573"/>
           </a:xfrm>
           <a:prstGeom prst="bentConnector2">
             <a:avLst/>
@@ -8728,7 +8647,7 @@
           <a:p>
             <a:pPr algn="ctr"/>
             <a:r>
-              <a:rPr lang="en-US" sz="1050" dirty="0" err="1">
+              <a:rPr lang="en-US" sz="1050" dirty="0">
                 <a:solidFill>
                   <a:schemeClr val="bg1"/>
                 </a:solidFill>
@@ -8978,7 +8897,7 @@
           <a:p>
             <a:pPr algn="ctr"/>
             <a:r>
-              <a:rPr lang="en-US" sz="1050" dirty="0" err="1" smtClean="0">
+              <a:rPr lang="en-US" sz="1050" dirty="0" smtClean="0">
                 <a:solidFill>
                   <a:schemeClr val="bg1"/>
                 </a:solidFill>
@@ -9033,7 +8952,7 @@
           <a:lstStyle/>
           <a:p>
             <a:pPr algn="ctr"/>
-            <a:endParaRPr lang="en-SG" sz="1050" b="1">
+            <a:endParaRPr lang="en-SG" sz="1050" b="1" dirty="0">
               <a:solidFill>
                 <a:srgbClr val="92D050"/>
               </a:solidFill>
@@ -9176,7 +9095,7 @@
         </p:nvCxnSpPr>
         <p:spPr>
           <a:xfrm rot="16200000" flipH="1">
-            <a:off x="3430123" y="3938021"/>
+            <a:off x="3469900" y="4274785"/>
             <a:ext cx="118421" cy="699979"/>
           </a:xfrm>
           <a:prstGeom prst="bentConnector2">
@@ -9217,8 +9136,8 @@
         </p:nvCxnSpPr>
         <p:spPr>
           <a:xfrm rot="5400000">
-            <a:off x="3695875" y="2276286"/>
-            <a:ext cx="1824381" cy="1843808"/>
+            <a:off x="3547382" y="2464557"/>
+            <a:ext cx="2161145" cy="1804031"/>
           </a:xfrm>
           <a:prstGeom prst="bentConnector2">
             <a:avLst/>
@@ -9296,7 +9215,7 @@
           <a:lstStyle/>
           <a:p>
             <a:pPr algn="ctr"/>
-            <a:endParaRPr lang="en-SG"/>
+            <a:endParaRPr lang="en-SG" dirty="0"/>
           </a:p>
         </p:txBody>
       </p:sp>
@@ -9378,7 +9297,7 @@
           <a:lstStyle/>
           <a:p>
             <a:pPr algn="ctr"/>
-            <a:endParaRPr lang="en-SG"/>
+            <a:endParaRPr lang="en-SG" dirty="0"/>
           </a:p>
         </p:txBody>
       </p:sp>
@@ -9431,7 +9350,7 @@
           <a:lstStyle/>
           <a:p>
             <a:pPr algn="ctr"/>
-            <a:endParaRPr lang="en-SG"/>
+            <a:endParaRPr lang="en-SG" dirty="0"/>
           </a:p>
         </p:txBody>
       </p:sp>
@@ -9443,7 +9362,7 @@
         </p:nvSpPr>
         <p:spPr>
           <a:xfrm flipV="1">
-            <a:off x="4114799" y="4472708"/>
+            <a:off x="4114798" y="4821761"/>
             <a:ext cx="2642195" cy="101600"/>
           </a:xfrm>
           <a:custGeom>
@@ -9513,10 +9432,389 @@
           <a:lstStyle/>
           <a:p>
             <a:pPr algn="ctr"/>
-            <a:endParaRPr lang="en-SG"/>
-          </a:p>
-        </p:txBody>
-      </p:sp>
+            <a:endParaRPr lang="en-SG" dirty="0"/>
+          </a:p>
+        </p:txBody>
+      </p:sp>
+      <p:grpSp>
+        <p:nvGrpSpPr>
+          <p:cNvPr id="4" name="Group 3"/>
+          <p:cNvGrpSpPr/>
+          <p:nvPr/>
+        </p:nvGrpSpPr>
+        <p:grpSpPr>
+          <a:xfrm>
+            <a:off x="2598049" y="2077688"/>
+            <a:ext cx="4164468" cy="2288309"/>
+            <a:chOff x="3139344" y="3998735"/>
+            <a:chExt cx="4164468" cy="2288309"/>
+          </a:xfrm>
+        </p:grpSpPr>
+        <p:sp>
+          <p:nvSpPr>
+            <p:cNvPr id="42" name="Rectangle 11"/>
+            <p:cNvSpPr/>
+            <p:nvPr/>
+          </p:nvSpPr>
+          <p:spPr>
+            <a:xfrm>
+              <a:off x="3139344" y="5704696"/>
+              <a:ext cx="1093635" cy="236841"/>
+            </a:xfrm>
+            <a:prstGeom prst="rect">
+              <a:avLst/>
+            </a:prstGeom>
+            <a:ln w="19050">
+              <a:solidFill>
+                <a:schemeClr val="accent3"/>
+              </a:solidFill>
+            </a:ln>
+            <a:effectLst/>
+          </p:spPr>
+          <p:style>
+            <a:lnRef idx="1">
+              <a:schemeClr val="accent3"/>
+            </a:lnRef>
+            <a:fillRef idx="2">
+              <a:schemeClr val="accent3"/>
+            </a:fillRef>
+            <a:effectRef idx="1">
+              <a:schemeClr val="accent3"/>
+            </a:effectRef>
+            <a:fontRef idx="minor">
+              <a:schemeClr val="dk1"/>
+            </a:fontRef>
+          </p:style>
+          <p:txBody>
+            <a:bodyPr rtlCol="0" anchor="ctr"/>
+            <a:lstStyle/>
+            <a:p>
+              <a:pPr algn="ctr"/>
+              <a:r>
+                <a:rPr lang="en-US" sz="1050" b="1" dirty="0" smtClean="0">
+                  <a:solidFill>
+                    <a:schemeClr val="accent3">
+                      <a:lumMod val="75000"/>
+                    </a:schemeClr>
+                  </a:solidFill>
+                </a:rPr>
+                <a:t>TagListPanel</a:t>
+              </a:r>
+              <a:endParaRPr lang="en-SG" sz="1050" b="1" dirty="0">
+                <a:solidFill>
+                  <a:schemeClr val="accent3">
+                    <a:lumMod val="75000"/>
+                  </a:schemeClr>
+                </a:solidFill>
+              </a:endParaRPr>
+            </a:p>
+          </p:txBody>
+        </p:sp>
+        <p:sp>
+          <p:nvSpPr>
+            <p:cNvPr id="44" name="Rectangle 11"/>
+            <p:cNvSpPr/>
+            <p:nvPr/>
+          </p:nvSpPr>
+          <p:spPr>
+            <a:xfrm>
+              <a:off x="4386141" y="5941537"/>
+              <a:ext cx="1040906" cy="236841"/>
+            </a:xfrm>
+            <a:prstGeom prst="rect">
+              <a:avLst/>
+            </a:prstGeom>
+            <a:ln w="19050">
+              <a:solidFill>
+                <a:schemeClr val="accent3"/>
+              </a:solidFill>
+            </a:ln>
+            <a:effectLst/>
+          </p:spPr>
+          <p:style>
+            <a:lnRef idx="1">
+              <a:schemeClr val="accent3"/>
+            </a:lnRef>
+            <a:fillRef idx="2">
+              <a:schemeClr val="accent3"/>
+            </a:fillRef>
+            <a:effectRef idx="1">
+              <a:schemeClr val="accent3"/>
+            </a:effectRef>
+            <a:fontRef idx="minor">
+              <a:schemeClr val="dk1"/>
+            </a:fontRef>
+          </p:style>
+          <p:txBody>
+            <a:bodyPr rtlCol="0" anchor="ctr"/>
+            <a:lstStyle/>
+            <a:p>
+              <a:pPr algn="ctr"/>
+              <a:r>
+                <a:rPr lang="en-US" sz="1050" b="1" dirty="0" smtClean="0">
+                  <a:solidFill>
+                    <a:schemeClr val="accent3">
+                      <a:lumMod val="75000"/>
+                    </a:schemeClr>
+                  </a:solidFill>
+                </a:rPr>
+                <a:t>TagCard</a:t>
+              </a:r>
+              <a:endParaRPr lang="en-SG" sz="1050" b="1" dirty="0">
+                <a:solidFill>
+                  <a:schemeClr val="accent3">
+                    <a:lumMod val="75000"/>
+                  </a:schemeClr>
+                </a:solidFill>
+              </a:endParaRPr>
+            </a:p>
+          </p:txBody>
+        </p:sp>
+        <p:cxnSp>
+          <p:nvCxnSpPr>
+            <p:cNvPr id="45" name="Elbow Connector 63"/>
+            <p:cNvCxnSpPr>
+              <a:endCxn id="44" idx="3"/>
+            </p:cNvCxnSpPr>
+            <p:nvPr/>
+          </p:nvCxnSpPr>
+          <p:spPr>
+            <a:xfrm rot="5400000">
+              <a:off x="4721306" y="4704477"/>
+              <a:ext cx="2061222" cy="649740"/>
+            </a:xfrm>
+            <a:prstGeom prst="bentConnector2">
+              <a:avLst/>
+            </a:prstGeom>
+            <a:ln w="6350">
+              <a:solidFill>
+                <a:schemeClr val="accent3"/>
+              </a:solidFill>
+              <a:headEnd type="none" w="med" len="med"/>
+              <a:tailEnd type="none" w="med" len="med"/>
+            </a:ln>
+            <a:effectLst/>
+          </p:spPr>
+          <p:style>
+            <a:lnRef idx="1">
+              <a:schemeClr val="accent2"/>
+            </a:lnRef>
+            <a:fillRef idx="2">
+              <a:schemeClr val="accent2"/>
+            </a:fillRef>
+            <a:effectRef idx="1">
+              <a:schemeClr val="accent2"/>
+            </a:effectRef>
+            <a:fontRef idx="minor">
+              <a:schemeClr val="dk1"/>
+            </a:fontRef>
+          </p:style>
+        </p:cxnSp>
+        <p:cxnSp>
+          <p:nvCxnSpPr>
+            <p:cNvPr id="46" name="Elbow Connector 45"/>
+            <p:cNvCxnSpPr>
+              <a:stCxn id="42" idx="2"/>
+              <a:endCxn id="44" idx="1"/>
+            </p:cNvCxnSpPr>
+            <p:nvPr/>
+          </p:nvCxnSpPr>
+          <p:spPr>
+            <a:xfrm rot="16200000" flipH="1">
+              <a:off x="3976941" y="5650757"/>
+              <a:ext cx="118421" cy="699979"/>
+            </a:xfrm>
+            <a:prstGeom prst="bentConnector2">
+              <a:avLst/>
+            </a:prstGeom>
+            <a:ln w="19050">
+              <a:solidFill>
+                <a:schemeClr val="accent3"/>
+              </a:solidFill>
+              <a:headEnd type="none" w="med" len="med"/>
+              <a:tailEnd type="arrow" w="med" len="med"/>
+            </a:ln>
+            <a:effectLst/>
+          </p:spPr>
+          <p:style>
+            <a:lnRef idx="1">
+              <a:schemeClr val="accent2"/>
+            </a:lnRef>
+            <a:fillRef idx="2">
+              <a:schemeClr val="accent2"/>
+            </a:fillRef>
+            <a:effectRef idx="1">
+              <a:schemeClr val="accent2"/>
+            </a:effectRef>
+            <a:fontRef idx="minor">
+              <a:schemeClr val="dk1"/>
+            </a:fontRef>
+          </p:style>
+        </p:cxnSp>
+        <p:cxnSp>
+          <p:nvCxnSpPr>
+            <p:cNvPr id="48" name="Elbow Connector 63"/>
+            <p:cNvCxnSpPr>
+              <a:endCxn id="42" idx="3"/>
+            </p:cNvCxnSpPr>
+            <p:nvPr/>
+          </p:nvCxnSpPr>
+          <p:spPr>
+            <a:xfrm rot="5400000">
+              <a:off x="4242693" y="3989022"/>
+              <a:ext cx="1824381" cy="1843808"/>
+            </a:xfrm>
+            <a:prstGeom prst="bentConnector2">
+              <a:avLst/>
+            </a:prstGeom>
+            <a:ln w="6350">
+              <a:solidFill>
+                <a:schemeClr val="accent3"/>
+              </a:solidFill>
+              <a:headEnd type="none" w="med" len="med"/>
+              <a:tailEnd type="none" w="med" len="med"/>
+            </a:ln>
+            <a:effectLst/>
+          </p:spPr>
+          <p:style>
+            <a:lnRef idx="1">
+              <a:schemeClr val="accent2"/>
+            </a:lnRef>
+            <a:fillRef idx="2">
+              <a:schemeClr val="accent2"/>
+            </a:fillRef>
+            <a:effectRef idx="1">
+              <a:schemeClr val="accent2"/>
+            </a:effectRef>
+            <a:fontRef idx="minor">
+              <a:schemeClr val="dk1"/>
+            </a:fontRef>
+          </p:style>
+        </p:cxnSp>
+        <p:sp>
+          <p:nvSpPr>
+            <p:cNvPr id="49" name="Freeform 48"/>
+            <p:cNvSpPr/>
+            <p:nvPr/>
+          </p:nvSpPr>
+          <p:spPr>
+            <a:xfrm flipV="1">
+              <a:off x="4661617" y="6185444"/>
+              <a:ext cx="2642195" cy="101600"/>
+            </a:xfrm>
+            <a:custGeom>
+              <a:avLst/>
+              <a:gdLst>
+                <a:gd name="connsiteX0" fmla="*/ 0 w 3048000"/>
+                <a:gd name="connsiteY0" fmla="*/ 203200 h 203200"/>
+                <a:gd name="connsiteX1" fmla="*/ 221673 w 3048000"/>
+                <a:gd name="connsiteY1" fmla="*/ 0 h 203200"/>
+                <a:gd name="connsiteX2" fmla="*/ 3048000 w 3048000"/>
+                <a:gd name="connsiteY2" fmla="*/ 0 h 203200"/>
+              </a:gdLst>
+              <a:ahLst/>
+              <a:cxnLst>
+                <a:cxn ang="0">
+                  <a:pos x="connsiteX0" y="connsiteY0"/>
+                </a:cxn>
+                <a:cxn ang="0">
+                  <a:pos x="connsiteX1" y="connsiteY1"/>
+                </a:cxn>
+                <a:cxn ang="0">
+                  <a:pos x="connsiteX2" y="connsiteY2"/>
+                </a:cxn>
+              </a:cxnLst>
+              <a:rect l="l" t="t" r="r" b="b"/>
+              <a:pathLst>
+                <a:path w="3048000" h="203200">
+                  <a:moveTo>
+                    <a:pt x="0" y="203200"/>
+                  </a:moveTo>
+                  <a:lnTo>
+                    <a:pt x="221673" y="0"/>
+                  </a:lnTo>
+                  <a:lnTo>
+                    <a:pt x="3048000" y="0"/>
+                  </a:lnTo>
+                </a:path>
+              </a:pathLst>
+            </a:custGeom>
+            <a:noFill/>
+            <a:ln w="19050">
+              <a:solidFill>
+                <a:schemeClr val="accent3"/>
+              </a:solidFill>
+              <a:prstDash val="sysDot"/>
+              <a:headEnd type="none" w="med" len="med"/>
+              <a:tailEnd type="arrow" w="med" len="med"/>
+            </a:ln>
+            <a:effectLst/>
+          </p:spPr>
+          <p:style>
+            <a:lnRef idx="1">
+              <a:schemeClr val="accent2"/>
+            </a:lnRef>
+            <a:fillRef idx="2">
+              <a:schemeClr val="accent2"/>
+            </a:fillRef>
+            <a:effectRef idx="1">
+              <a:schemeClr val="accent2"/>
+            </a:effectRef>
+            <a:fontRef idx="minor">
+              <a:schemeClr val="dk1"/>
+            </a:fontRef>
+          </p:style>
+          <p:txBody>
+            <a:bodyPr rtlCol="0" anchor="ctr"/>
+            <a:lstStyle/>
+            <a:p>
+              <a:pPr algn="ctr"/>
+              <a:endParaRPr lang="en-SG" dirty="0"/>
+            </a:p>
+          </p:txBody>
+        </p:sp>
+      </p:grpSp>
+      <p:cxnSp>
+        <p:nvCxnSpPr>
+          <p:cNvPr id="61" name="Elbow Connector 63"/>
+          <p:cNvCxnSpPr>
+            <a:stCxn id="39" idx="2"/>
+            <a:endCxn id="42" idx="1"/>
+          </p:cNvCxnSpPr>
+          <p:nvPr/>
+        </p:nvCxnSpPr>
+        <p:spPr>
+          <a:xfrm rot="16200000" flipH="1">
+            <a:off x="1990065" y="3294085"/>
+            <a:ext cx="1034045" cy="181923"/>
+          </a:xfrm>
+          <a:prstGeom prst="bentConnector2">
+            <a:avLst/>
+          </a:prstGeom>
+          <a:ln w="19050">
+            <a:solidFill>
+              <a:schemeClr val="accent3"/>
+            </a:solidFill>
+            <a:headEnd type="none" w="med" len="med"/>
+            <a:tailEnd type="arrow" w="med" len="med"/>
+          </a:ln>
+          <a:effectLst/>
+        </p:spPr>
+        <p:style>
+          <a:lnRef idx="1">
+            <a:schemeClr val="accent2"/>
+          </a:lnRef>
+          <a:fillRef idx="2">
+            <a:schemeClr val="accent2"/>
+          </a:fillRef>
+          <a:effectRef idx="1">
+            <a:schemeClr val="accent2"/>
+          </a:effectRef>
+          <a:fontRef idx="minor">
+            <a:schemeClr val="dk1"/>
+          </a:fontRef>
+        </p:style>
+      </p:cxnSp>
     </p:spTree>
     <p:extLst>
       <p:ext uri="{BB962C8B-B14F-4D97-AF65-F5344CB8AC3E}">
@@ -9659,7 +9957,7 @@
           <a:p>
             <a:pPr algn="ctr"/>
             <a:r>
-              <a:rPr lang="en-US" sz="1050" dirty="0" err="1">
+              <a:rPr lang="en-US" sz="1050" dirty="0">
                 <a:solidFill>
                   <a:schemeClr val="bg1"/>
                 </a:solidFill>
@@ -9718,7 +10016,7 @@
           <a:p>
             <a:pPr algn="ctr"/>
             <a:r>
-              <a:rPr lang="en-US" sz="1050" dirty="0" err="1" smtClean="0">
+              <a:rPr lang="en-US" sz="1050" dirty="0" smtClean="0">
                 <a:solidFill>
                   <a:schemeClr val="bg1"/>
                 </a:solidFill>
@@ -10139,7 +10437,7 @@
           <a:lstStyle/>
           <a:p>
             <a:pPr algn="ctr"/>
-            <a:endParaRPr lang="en-SG" sz="1050" b="1">
+            <a:endParaRPr lang="en-SG" sz="1050" b="1" dirty="0">
               <a:solidFill>
                 <a:srgbClr val="92D050"/>
               </a:solidFill>
@@ -10451,7 +10749,7 @@
             <a:lstStyle/>
             <a:p>
               <a:pPr algn="ctr"/>
-              <a:endParaRPr lang="en-SG"/>
+              <a:endParaRPr lang="en-SG" dirty="0"/>
             </a:p>
           </p:txBody>
         </p:sp>
@@ -10550,7 +10848,7 @@
             <a:lstStyle/>
             <a:p>
               <a:pPr algn="ctr"/>
-              <a:endParaRPr lang="en-SG"/>
+              <a:endParaRPr lang="en-SG" dirty="0"/>
             </a:p>
           </p:txBody>
         </p:sp>
@@ -10728,7 +11026,7 @@
             <a:lstStyle/>
             <a:p>
               <a:pPr algn="ctr"/>
-              <a:endParaRPr lang="en-SG"/>
+              <a:endParaRPr lang="en-SG" dirty="0"/>
             </a:p>
           </p:txBody>
         </p:sp>
@@ -10842,7 +11140,7 @@
               <a:lstStyle/>
               <a:p>
                 <a:pPr algn="ctr"/>
-                <a:endParaRPr lang="en-SG" sz="1050" b="1">
+                <a:endParaRPr lang="en-SG" sz="1050" b="1" dirty="0">
                   <a:solidFill>
                     <a:srgbClr val="92D050"/>
                   </a:solidFill>
@@ -10905,7 +11203,7 @@
                 <a:p>
                   <a:pPr algn="ctr"/>
                   <a:r>
-                    <a:rPr lang="en-US" sz="1050" b="1" dirty="0" err="1">
+                    <a:rPr lang="en-US" sz="1050" b="1" dirty="0">
                       <a:solidFill>
                         <a:srgbClr val="0070C0"/>
                       </a:solidFill>
@@ -10961,7 +11259,7 @@
                 <a:p>
                   <a:pPr algn="ctr"/>
                   <a:r>
-                    <a:rPr lang="en-US" sz="1050" b="1" dirty="0" err="1">
+                    <a:rPr lang="en-US" sz="1050" b="1" dirty="0">
                       <a:solidFill>
                         <a:srgbClr val="0070C0"/>
                       </a:solidFill>
@@ -11387,7 +11685,7 @@
                 <a:p>
                   <a:pPr algn="ctr"/>
                   <a:r>
-                    <a:rPr lang="en-US" sz="1050" b="1" smtClean="0">
+                    <a:rPr lang="en-US" sz="1050" b="1" dirty="0" smtClean="0">
                       <a:solidFill>
                         <a:srgbClr val="0070C0"/>
                       </a:solidFill>
@@ -11398,7 +11696,7 @@
                 <a:p>
                   <a:pPr algn="ctr"/>
                   <a:r>
-                    <a:rPr lang="en-US" sz="1050" b="1" dirty="0" err="1" smtClean="0">
+                    <a:rPr lang="en-US" sz="1050" b="1" dirty="0" smtClean="0">
                       <a:solidFill>
                         <a:srgbClr val="0070C0"/>
                       </a:solidFill>
@@ -11494,7 +11792,7 @@
                 <a:p>
                   <a:pPr algn="ctr"/>
                   <a:r>
-                    <a:rPr lang="en-US" sz="1050" b="1" dirty="0" err="1" smtClean="0">
+                    <a:rPr lang="en-US" sz="1050" b="1" dirty="0" smtClean="0">
                       <a:solidFill>
                         <a:srgbClr val="0070C0"/>
                       </a:solidFill>
@@ -11585,7 +11883,7 @@
                 <a:lstStyle/>
                 <a:p>
                   <a:pPr algn="ctr"/>
-                  <a:endParaRPr lang="en-US"/>
+                  <a:endParaRPr lang="en-US" dirty="0"/>
                 </a:p>
               </p:txBody>
             </p:sp>
@@ -11769,7 +12067,7 @@
             <a:lstStyle/>
             <a:p>
               <a:pPr algn="ctr"/>
-              <a:endParaRPr lang="en-SG" sz="1050" b="1">
+              <a:endParaRPr lang="en-SG" sz="1050" b="1" dirty="0">
                 <a:solidFill>
                   <a:srgbClr val="92D050"/>
                 </a:solidFill>
@@ -11984,7 +12282,7 @@
             <a:lstStyle/>
             <a:p>
               <a:pPr algn="ctr"/>
-              <a:endParaRPr lang="en-SG"/>
+              <a:endParaRPr lang="en-SG" dirty="0"/>
             </a:p>
           </p:txBody>
         </p:sp>
@@ -12253,15 +12551,7 @@
                   <a:schemeClr val="bg1"/>
                 </a:solidFill>
               </a:rPr>
-              <a:t>:</a:t>
-            </a:r>
-            <a:r>
-              <a:rPr lang="en-US" sz="1600" dirty="0" err="1">
-                <a:solidFill>
-                  <a:schemeClr val="bg1"/>
-                </a:solidFill>
-              </a:rPr>
-              <a:t>LogicManager</a:t>
+              <a:t>:LogicManager</a:t>
             </a:r>
             <a:endParaRPr lang="en-SG" sz="1600" dirty="0">
               <a:solidFill>
@@ -12351,7 +12641,7 @@
           <a:lstStyle/>
           <a:p>
             <a:pPr algn="ctr"/>
-            <a:endParaRPr lang="en-SG" sz="1400"/>
+            <a:endParaRPr lang="en-SG" sz="1400" dirty="0"/>
           </a:p>
         </p:txBody>
       </p:sp>
@@ -12494,7 +12784,7 @@
           <a:lstStyle/>
           <a:p>
             <a:pPr algn="ctr"/>
-            <a:endParaRPr lang="en-SG" sz="1400">
+            <a:endParaRPr lang="en-SG" sz="1400" dirty="0">
               <a:solidFill>
                 <a:schemeClr val="dk1"/>
               </a:solidFill>
@@ -12546,7 +12836,7 @@
           <a:p>
             <a:pPr algn="ctr"/>
             <a:r>
-              <a:rPr lang="en-US" sz="1600" dirty="0" err="1">
+              <a:rPr lang="en-US" sz="1600" dirty="0">
                 <a:solidFill>
                   <a:schemeClr val="bg1"/>
                 </a:solidFill>
@@ -12554,7 +12844,7 @@
               <a:t>a</a:t>
             </a:r>
             <a:r>
-              <a:rPr lang="en-US" sz="1600" dirty="0" err="1" smtClean="0">
+              <a:rPr lang="en-US" sz="1600" dirty="0" smtClean="0">
                 <a:solidFill>
                   <a:schemeClr val="bg1"/>
                 </a:solidFill>
@@ -12675,7 +12965,7 @@
           <a:lstStyle/>
           <a:p>
             <a:pPr algn="ctr"/>
-            <a:endParaRPr lang="en-SG" sz="1400"/>
+            <a:endParaRPr lang="en-SG" sz="1400" dirty="0"/>
           </a:p>
         </p:txBody>
       </p:sp>
@@ -12780,15 +13070,7 @@
                   <a:srgbClr val="0070C0"/>
                 </a:solidFill>
               </a:rPr>
-              <a:t>execute(“</a:t>
-            </a:r>
-            <a:r>
-              <a:rPr lang="en-US" sz="1400" smtClean="0">
-                <a:solidFill>
-                  <a:srgbClr val="0070C0"/>
-                </a:solidFill>
-              </a:rPr>
-              <a:t>add Name”)</a:t>
+              <a:t>execute(“add Name”)</a:t>
             </a:r>
             <a:endParaRPr lang="en-US" sz="1400" dirty="0">
               <a:solidFill>
@@ -13134,7 +13416,7 @@
           <a:lstStyle/>
           <a:p>
             <a:pPr algn="ctr"/>
-            <a:endParaRPr lang="en-SG" sz="1400"/>
+            <a:endParaRPr lang="en-SG" sz="1400" dirty="0"/>
           </a:p>
         </p:txBody>
       </p:sp>
@@ -13227,7 +13509,7 @@
           <a:lstStyle/>
           <a:p>
             <a:pPr algn="ctr"/>
-            <a:endParaRPr lang="en-SG" sz="1400">
+            <a:endParaRPr lang="en-SG" sz="1400" dirty="0">
               <a:solidFill>
                 <a:schemeClr val="dk1"/>
               </a:solidFill>
@@ -13386,20 +13668,12 @@
           </a:lstStyle>
           <a:p>
             <a:r>
-              <a:rPr lang="en-US" dirty="0" err="1" smtClean="0">
-                <a:solidFill>
-                  <a:srgbClr val="7030A0"/>
-                </a:solidFill>
-              </a:rPr>
-              <a:t>addTask</a:t>
-            </a:r>
-            <a:r>
               <a:rPr lang="en-US" dirty="0" smtClean="0">
                 <a:solidFill>
                   <a:srgbClr val="7030A0"/>
                 </a:solidFill>
               </a:rPr>
-              <a:t>(t)</a:t>
+              <a:t>addTask(t)</a:t>
             </a:r>
             <a:endParaRPr lang="en-US" dirty="0">
               <a:solidFill>
@@ -13443,7 +13717,7 @@
           </a:lstStyle>
           <a:p>
             <a:r>
-              <a:rPr lang="en-US" smtClean="0"/>
+              <a:rPr lang="en-US" dirty="0" smtClean="0"/>
               <a:t>create(props)</a:t>
             </a:r>
             <a:endParaRPr lang="en-US" dirty="0"/>
@@ -13632,7 +13906,7 @@
               </a:rPr>
             </a:br>
             <a:r>
-              <a:rPr lang="en-US" sz="1600" dirty="0" err="1" smtClean="0">
+              <a:rPr lang="en-US" sz="1600" dirty="0" smtClean="0">
                 <a:solidFill>
                   <a:schemeClr val="bg1"/>
                 </a:solidFill>
@@ -13690,7 +13964,7 @@
           <a:lstStyle/>
           <a:p>
             <a:pPr algn="ctr"/>
-            <a:endParaRPr lang="en-SG" sz="1400"/>
+            <a:endParaRPr lang="en-SG" sz="1400" dirty="0"/>
           </a:p>
         </p:txBody>
       </p:sp>
@@ -13931,15 +14205,7 @@
                   <a:schemeClr val="bg1"/>
                 </a:solidFill>
               </a:rPr>
-              <a:t>:</a:t>
-            </a:r>
-            <a:r>
-              <a:rPr lang="en-US" sz="1600" dirty="0" err="1" smtClean="0">
-                <a:solidFill>
-                  <a:schemeClr val="bg1"/>
-                </a:solidFill>
-              </a:rPr>
-              <a:t>ExtensionParser</a:t>
+              <a:t>:ExtensionParser</a:t>
             </a:r>
             <a:endParaRPr lang="en-SG" sz="1600" dirty="0">
               <a:solidFill>
@@ -14029,7 +14295,7 @@
           <a:lstStyle/>
           <a:p>
             <a:pPr algn="ctr"/>
-            <a:endParaRPr lang="en-SG" sz="1400">
+            <a:endParaRPr lang="en-SG" sz="1400" dirty="0">
               <a:solidFill>
                 <a:schemeClr val="dk1"/>
               </a:solidFill>
@@ -14127,7 +14393,7 @@
           <a:lstStyle/>
           <a:p>
             <a:pPr algn="ctr"/>
-            <a:endParaRPr lang="en-SG" sz="1400">
+            <a:endParaRPr lang="en-SG" sz="1400" dirty="0">
               <a:solidFill>
                 <a:schemeClr val="dk1"/>
               </a:solidFill>
@@ -14248,20 +14514,12 @@
           </a:lstStyle>
           <a:p>
             <a:r>
-              <a:rPr lang="en-US" dirty="0" err="1" smtClean="0">
-                <a:solidFill>
-                  <a:srgbClr val="7030A0"/>
-                </a:solidFill>
-              </a:rPr>
-              <a:t>constructProperties</a:t>
-            </a:r>
-            <a:r>
               <a:rPr lang="en-US" dirty="0" smtClean="0">
                 <a:solidFill>
                   <a:srgbClr val="7030A0"/>
                 </a:solidFill>
               </a:rPr>
-              <a:t>(props)</a:t>
+              <a:t>constructProperties(props)</a:t>
             </a:r>
             <a:endParaRPr lang="en-US" dirty="0">
               <a:solidFill>
@@ -14396,7 +14654,7 @@
           <a:lstStyle/>
           <a:p>
             <a:pPr algn="ctr"/>
-            <a:endParaRPr lang="en-SG" sz="1400">
+            <a:endParaRPr lang="en-SG" sz="1400" dirty="0">
               <a:solidFill>
                 <a:schemeClr val="dk1"/>
               </a:solidFill>
@@ -14442,8 +14700,8 @@
         </p:nvSpPr>
         <p:spPr>
           <a:xfrm>
-            <a:off x="819374" y="1727200"/>
-            <a:ext cx="7715026" cy="2997200"/>
+            <a:off x="235174" y="1600200"/>
+            <a:ext cx="8832626" cy="2971800"/>
           </a:xfrm>
           <a:prstGeom prst="roundRect">
             <a:avLst>
@@ -14503,7 +14761,7 @@
         </p:nvSpPr>
         <p:spPr>
           <a:xfrm>
-            <a:off x="2576689" y="3158440"/>
+            <a:off x="1992489" y="3031440"/>
             <a:ext cx="1093635" cy="346760"/>
           </a:xfrm>
           <a:prstGeom prst="rect">
@@ -14539,7 +14797,7 @@
           <a:p>
             <a:pPr algn="ctr"/>
             <a:r>
-              <a:rPr lang="en-US" sz="1050" dirty="0" err="1" smtClean="0">
+              <a:rPr lang="en-US" sz="1050" dirty="0" smtClean="0">
                 <a:solidFill>
                   <a:schemeClr val="bg1"/>
                 </a:solidFill>
@@ -14562,7 +14820,7 @@
         </p:nvSpPr>
         <p:spPr>
           <a:xfrm rot="16200000">
-            <a:off x="1383472" y="2868687"/>
+            <a:off x="799272" y="2741687"/>
             <a:ext cx="1093635" cy="346760"/>
           </a:xfrm>
           <a:prstGeom prst="rect">
@@ -14598,7 +14856,7 @@
           <a:p>
             <a:pPr algn="ctr"/>
             <a:r>
-              <a:rPr lang="en-US" sz="1050" dirty="0" err="1" smtClean="0">
+              <a:rPr lang="en-US" sz="1050" dirty="0" smtClean="0">
                 <a:solidFill>
                   <a:schemeClr val="bg1"/>
                 </a:solidFill>
@@ -14624,7 +14882,7 @@
         </p:nvCxnSpPr>
         <p:spPr>
           <a:xfrm flipV="1">
-            <a:off x="6176509" y="3204826"/>
+            <a:off x="5592309" y="3077826"/>
             <a:ext cx="190770" cy="405819"/>
           </a:xfrm>
           <a:prstGeom prst="bentConnector2">
@@ -14665,7 +14923,7 @@
         </p:nvCxnSpPr>
         <p:spPr>
           <a:xfrm rot="5400000" flipH="1" flipV="1">
-            <a:off x="4059574" y="1080909"/>
+            <a:off x="3475374" y="953909"/>
             <a:ext cx="378691" cy="4637261"/>
           </a:xfrm>
           <a:prstGeom prst="bentConnector4">
@@ -14707,7 +14965,7 @@
         </p:nvSpPr>
         <p:spPr>
           <a:xfrm rot="16200000">
-            <a:off x="655711" y="2861202"/>
+            <a:off x="71511" y="2734202"/>
             <a:ext cx="1093635" cy="346760"/>
           </a:xfrm>
           <a:prstGeom prst="rect">
@@ -14777,7 +15035,7 @@
         </p:nvSpPr>
         <p:spPr>
           <a:xfrm rot="16200000">
-            <a:off x="1326419" y="2952291"/>
+            <a:off x="742219" y="2825291"/>
             <a:ext cx="270504" cy="175523"/>
           </a:xfrm>
           <a:prstGeom prst="triangle">
@@ -14812,52 +15070,10 @@
           <a:lstStyle/>
           <a:p>
             <a:pPr algn="ctr"/>
-            <a:endParaRPr lang="en-SG" sz="1050"/>
-          </a:p>
-        </p:txBody>
-      </p:sp>
-      <p:cxnSp>
-        <p:nvCxnSpPr>
-          <p:cNvPr id="65" name="Straight Arrow Connector 64"/>
-          <p:cNvCxnSpPr>
-            <a:stCxn id="94" idx="0"/>
-            <a:endCxn id="98" idx="2"/>
-          </p:cNvCxnSpPr>
-          <p:nvPr/>
-        </p:nvCxnSpPr>
-        <p:spPr>
-          <a:xfrm flipV="1">
-            <a:off x="6367279" y="2632344"/>
-            <a:ext cx="1612" cy="225722"/>
-          </a:xfrm>
-          <a:prstGeom prst="straightConnector1">
-            <a:avLst/>
-          </a:prstGeom>
-          <a:ln w="19050">
-            <a:solidFill>
-              <a:srgbClr val="7030A0"/>
-            </a:solidFill>
-            <a:prstDash val="sysDot"/>
-            <a:headEnd type="none" w="med" len="med"/>
-            <a:tailEnd type="arrow" w="med" len="med"/>
-          </a:ln>
-          <a:effectLst/>
-        </p:spPr>
-        <p:style>
-          <a:lnRef idx="1">
-            <a:schemeClr val="accent2"/>
-          </a:lnRef>
-          <a:fillRef idx="2">
-            <a:schemeClr val="accent2"/>
-          </a:fillRef>
-          <a:effectRef idx="1">
-            <a:schemeClr val="accent2"/>
-          </a:effectRef>
-          <a:fontRef idx="minor">
-            <a:schemeClr val="dk1"/>
-          </a:fontRef>
-        </p:style>
-      </p:cxnSp>
+            <a:endParaRPr lang="en-SG" sz="1050" dirty="0"/>
+          </a:p>
+        </p:txBody>
+      </p:sp>
       <p:cxnSp>
         <p:nvCxnSpPr>
           <p:cNvPr id="66" name="Straight Arrow Connector 65"/>
@@ -14869,7 +15085,7 @@
         </p:nvCxnSpPr>
         <p:spPr>
           <a:xfrm>
-            <a:off x="2355879" y="3326536"/>
+            <a:off x="1771679" y="3199536"/>
             <a:ext cx="220810" cy="5284"/>
           </a:xfrm>
           <a:prstGeom prst="straightConnector1">
@@ -14907,7 +15123,7 @@
         </p:nvSpPr>
         <p:spPr>
           <a:xfrm rot="5400000" flipV="1">
-            <a:off x="5953495" y="3522883"/>
+            <a:off x="5369295" y="3395883"/>
             <a:ext cx="270504" cy="175523"/>
           </a:xfrm>
           <a:prstGeom prst="triangle">
@@ -14942,7 +15158,7 @@
           <a:lstStyle/>
           <a:p>
             <a:pPr algn="ctr"/>
-            <a:endParaRPr lang="en-SG" sz="1050" b="1">
+            <a:endParaRPr lang="en-SG" sz="1050" b="1" dirty="0">
               <a:solidFill>
                 <a:srgbClr val="92D050"/>
               </a:solidFill>
@@ -14958,7 +15174,7 @@
         </p:nvCxnSpPr>
         <p:spPr>
           <a:xfrm>
-            <a:off x="609600" y="3040053"/>
+            <a:off x="25400" y="2913053"/>
             <a:ext cx="419548" cy="2860"/>
           </a:xfrm>
           <a:prstGeom prst="bentConnector3">
@@ -15003,7 +15219,7 @@
         </p:nvCxnSpPr>
         <p:spPr>
           <a:xfrm flipV="1">
-            <a:off x="1549433" y="3040052"/>
+            <a:off x="965233" y="2913052"/>
             <a:ext cx="216105" cy="1"/>
           </a:xfrm>
           <a:prstGeom prst="line">
@@ -15042,7 +15258,7 @@
         </p:nvSpPr>
         <p:spPr>
           <a:xfrm>
-            <a:off x="2119831" y="3239846"/>
+            <a:off x="1535631" y="3112846"/>
             <a:ext cx="236048" cy="173380"/>
           </a:xfrm>
           <a:prstGeom prst="flowChartDecision">
@@ -15075,7 +15291,7 @@
           <a:lstStyle/>
           <a:p>
             <a:pPr algn="ctr"/>
-            <a:endParaRPr lang="en-US" sz="1050"/>
+            <a:endParaRPr lang="en-US" sz="1050" dirty="0"/>
           </a:p>
         </p:txBody>
       </p:sp>
@@ -15087,7 +15303,7 @@
         </p:nvSpPr>
         <p:spPr>
           <a:xfrm>
-            <a:off x="2578999" y="2627420"/>
+            <a:off x="1994799" y="2500420"/>
             <a:ext cx="1093635" cy="346760"/>
           </a:xfrm>
           <a:prstGeom prst="rect">
@@ -15120,7 +15336,7 @@
           <a:p>
             <a:pPr algn="ctr"/>
             <a:r>
-              <a:rPr lang="en-US" sz="1050" dirty="0" err="1" smtClean="0">
+              <a:rPr lang="en-US" sz="1050" dirty="0" smtClean="0">
                 <a:solidFill>
                   <a:srgbClr val="7030A0"/>
                 </a:solidFill>
@@ -15146,7 +15362,7 @@
         </p:nvCxnSpPr>
         <p:spPr>
           <a:xfrm>
-            <a:off x="2358189" y="2795516"/>
+            <a:off x="1773989" y="2668516"/>
             <a:ext cx="220810" cy="5284"/>
           </a:xfrm>
           <a:prstGeom prst="straightConnector1">
@@ -15184,7 +15400,7 @@
         </p:nvSpPr>
         <p:spPr>
           <a:xfrm>
-            <a:off x="2122141" y="2708826"/>
+            <a:off x="1537941" y="2581826"/>
             <a:ext cx="236048" cy="173380"/>
           </a:xfrm>
           <a:prstGeom prst="flowChartDecision">
@@ -15217,7 +15433,7 @@
           <a:lstStyle/>
           <a:p>
             <a:pPr algn="ctr"/>
-            <a:endParaRPr lang="en-US" sz="1050"/>
+            <a:endParaRPr lang="en-US" sz="1050" dirty="0"/>
           </a:p>
         </p:txBody>
       </p:sp>
@@ -15229,7 +15445,7 @@
         </p:nvSpPr>
         <p:spPr>
           <a:xfrm>
-            <a:off x="4186526" y="2847371"/>
+            <a:off x="3602326" y="2720371"/>
             <a:ext cx="1156969" cy="346760"/>
           </a:xfrm>
           <a:prstGeom prst="rect">
@@ -15262,7 +15478,7 @@
           <a:p>
             <a:pPr algn="ctr"/>
             <a:r>
-              <a:rPr lang="en-US" sz="1050" dirty="0" err="1" smtClean="0">
+              <a:rPr lang="en-US" sz="1050" dirty="0" smtClean="0">
                 <a:solidFill>
                   <a:srgbClr val="7030A0"/>
                 </a:solidFill>
@@ -15285,7 +15501,7 @@
         </p:nvSpPr>
         <p:spPr>
           <a:xfrm>
-            <a:off x="3683812" y="2673991"/>
+            <a:off x="3099612" y="2546991"/>
             <a:ext cx="236048" cy="173380"/>
           </a:xfrm>
           <a:prstGeom prst="flowChartDecision">
@@ -15320,7 +15536,7 @@
           <a:lstStyle/>
           <a:p>
             <a:pPr algn="ctr"/>
-            <a:endParaRPr lang="en-US" sz="1050"/>
+            <a:endParaRPr lang="en-US" sz="1050" dirty="0"/>
           </a:p>
         </p:txBody>
       </p:sp>
@@ -15335,7 +15551,7 @@
         </p:nvCxnSpPr>
         <p:spPr>
           <a:xfrm>
-            <a:off x="3919860" y="2760681"/>
+            <a:off x="3335660" y="2633681"/>
             <a:ext cx="266666" cy="260070"/>
           </a:xfrm>
           <a:prstGeom prst="bentConnector3">
@@ -15373,7 +15589,7 @@
         </p:nvSpPr>
         <p:spPr>
           <a:xfrm>
-            <a:off x="4202713" y="2280569"/>
+            <a:off x="3618513" y="2153569"/>
             <a:ext cx="1156969" cy="346760"/>
           </a:xfrm>
           <a:prstGeom prst="rect">
@@ -15406,7 +15622,7 @@
           <a:p>
             <a:pPr algn="ctr"/>
             <a:r>
-              <a:rPr lang="en-US" sz="1050" dirty="0" err="1" smtClean="0">
+              <a:rPr lang="en-US" sz="1050" dirty="0" smtClean="0">
                 <a:solidFill>
                   <a:srgbClr val="7030A0"/>
                 </a:solidFill>
@@ -15432,7 +15648,7 @@
         </p:nvCxnSpPr>
         <p:spPr>
           <a:xfrm flipV="1">
-            <a:off x="3919860" y="2453949"/>
+            <a:off x="3335660" y="2326949"/>
             <a:ext cx="282853" cy="306732"/>
           </a:xfrm>
           <a:prstGeom prst="bentConnector3">
@@ -15472,7 +15688,7 @@
         </p:nvSpPr>
         <p:spPr>
           <a:xfrm>
-            <a:off x="6013186" y="2858066"/>
+            <a:off x="5428986" y="2731066"/>
             <a:ext cx="708186" cy="346760"/>
           </a:xfrm>
           <a:prstGeom prst="rect">
@@ -15528,7 +15744,7 @@
         </p:nvSpPr>
         <p:spPr>
           <a:xfrm>
-            <a:off x="5342736" y="2943979"/>
+            <a:off x="4758536" y="2816979"/>
             <a:ext cx="236048" cy="173380"/>
           </a:xfrm>
           <a:prstGeom prst="flowChartDecision">
@@ -15561,7 +15777,7 @@
           <a:lstStyle/>
           <a:p>
             <a:pPr algn="ctr"/>
-            <a:endParaRPr lang="en-US" sz="1050"/>
+            <a:endParaRPr lang="en-US" sz="1050" dirty="0"/>
           </a:p>
         </p:txBody>
       </p:sp>
@@ -15576,7 +15792,7 @@
         </p:nvCxnSpPr>
         <p:spPr>
           <a:xfrm>
-            <a:off x="5578784" y="3030669"/>
+            <a:off x="4994584" y="2903669"/>
             <a:ext cx="434402" cy="777"/>
           </a:xfrm>
           <a:prstGeom prst="bentConnector3">
@@ -15614,7 +15830,7 @@
         </p:nvSpPr>
         <p:spPr>
           <a:xfrm>
-            <a:off x="6014798" y="2285584"/>
+            <a:off x="5430598" y="2158584"/>
             <a:ext cx="708186" cy="346760"/>
           </a:xfrm>
           <a:prstGeom prst="rect">
@@ -15670,7 +15886,7 @@
         </p:nvSpPr>
         <p:spPr>
           <a:xfrm>
-            <a:off x="5372056" y="2371497"/>
+            <a:off x="4787856" y="2244497"/>
             <a:ext cx="236048" cy="173380"/>
           </a:xfrm>
           <a:prstGeom prst="flowChartDecision">
@@ -15703,7 +15919,7 @@
           <a:lstStyle/>
           <a:p>
             <a:pPr algn="ctr"/>
-            <a:endParaRPr lang="en-US" sz="1050"/>
+            <a:endParaRPr lang="en-US" sz="1050" dirty="0"/>
           </a:p>
         </p:txBody>
       </p:sp>
@@ -15718,7 +15934,7 @@
         </p:nvCxnSpPr>
         <p:spPr>
           <a:xfrm>
-            <a:off x="5608104" y="2458187"/>
+            <a:off x="5023904" y="2331187"/>
             <a:ext cx="406694" cy="777"/>
           </a:xfrm>
           <a:prstGeom prst="bentConnector3">
@@ -15756,7 +15972,7 @@
         </p:nvSpPr>
         <p:spPr>
           <a:xfrm>
-            <a:off x="4827766" y="3429000"/>
+            <a:off x="4243566" y="3302000"/>
             <a:ext cx="1156969" cy="346760"/>
           </a:xfrm>
           <a:prstGeom prst="rect">
@@ -15804,7 +16020,7 @@
               </a:rPr>
             </a:br>
             <a:r>
-              <a:rPr lang="en-US" sz="1050" dirty="0" err="1" smtClean="0">
+              <a:rPr lang="en-US" sz="1050" dirty="0" smtClean="0">
                 <a:solidFill>
                   <a:srgbClr val="7030A0"/>
                 </a:solidFill>
@@ -15821,69 +16037,13 @@
       </p:sp>
       <p:sp>
         <p:nvSpPr>
-          <p:cNvPr id="104" name="Rectangle 8"/>
-          <p:cNvSpPr/>
-          <p:nvPr/>
-        </p:nvSpPr>
-        <p:spPr>
-          <a:xfrm>
-            <a:off x="7411906" y="2564238"/>
-            <a:ext cx="893894" cy="285783"/>
-          </a:xfrm>
-          <a:prstGeom prst="rect">
-            <a:avLst/>
-          </a:prstGeom>
-          <a:ln w="19050">
-            <a:solidFill>
-              <a:srgbClr val="7030A0"/>
-            </a:solidFill>
-          </a:ln>
-          <a:effectLst/>
-        </p:spPr>
-        <p:style>
-          <a:lnRef idx="1">
-            <a:schemeClr val="accent4"/>
-          </a:lnRef>
-          <a:fillRef idx="2">
-            <a:schemeClr val="accent4"/>
-          </a:fillRef>
-          <a:effectRef idx="1">
-            <a:schemeClr val="accent4"/>
-          </a:effectRef>
-          <a:fontRef idx="minor">
-            <a:schemeClr val="dk1"/>
-          </a:fontRef>
-        </p:style>
-        <p:txBody>
-          <a:bodyPr rtlCol="0" anchor="ctr"/>
-          <a:lstStyle/>
-          <a:p>
-            <a:pPr algn="ctr"/>
-            <a:r>
-              <a:rPr lang="en-US" sz="1050" dirty="0" smtClean="0">
-                <a:solidFill>
-                  <a:srgbClr val="7030A0"/>
-                </a:solidFill>
-              </a:rPr>
-              <a:t>Venue</a:t>
-            </a:r>
-            <a:endParaRPr lang="en-SG" sz="1050" dirty="0">
-              <a:solidFill>
-                <a:srgbClr val="7030A0"/>
-              </a:solidFill>
-            </a:endParaRPr>
-          </a:p>
-        </p:txBody>
-      </p:sp>
-      <p:sp>
-        <p:nvSpPr>
           <p:cNvPr id="105" name="Flowchart: Decision 96"/>
           <p:cNvSpPr/>
           <p:nvPr/>
         </p:nvSpPr>
         <p:spPr>
           <a:xfrm>
-            <a:off x="6741456" y="2948201"/>
+            <a:off x="6157256" y="2821201"/>
             <a:ext cx="236048" cy="173380"/>
           </a:xfrm>
           <a:prstGeom prst="flowChartDecision">
@@ -15918,342 +16078,10 @@
           <a:lstStyle/>
           <a:p>
             <a:pPr algn="ctr"/>
-            <a:endParaRPr lang="en-US" sz="1050"/>
-          </a:p>
-        </p:txBody>
-      </p:sp>
-      <p:cxnSp>
-        <p:nvCxnSpPr>
-          <p:cNvPr id="106" name="Elbow Connector 105"/>
-          <p:cNvCxnSpPr>
-            <a:stCxn id="105" idx="3"/>
-            <a:endCxn id="104" idx="1"/>
-          </p:cNvCxnSpPr>
-          <p:nvPr/>
-        </p:nvCxnSpPr>
-        <p:spPr>
-          <a:xfrm flipV="1">
-            <a:off x="6977504" y="2707130"/>
-            <a:ext cx="434402" cy="327761"/>
-          </a:xfrm>
-          <a:prstGeom prst="bentConnector3">
-            <a:avLst/>
-          </a:prstGeom>
-          <a:ln w="19050">
-            <a:solidFill>
-              <a:srgbClr val="7030A0"/>
-            </a:solidFill>
-            <a:headEnd type="none" w="med" len="med"/>
-            <a:tailEnd type="arrow" w="med" len="med"/>
-          </a:ln>
-          <a:effectLst/>
-        </p:spPr>
-        <p:style>
-          <a:lnRef idx="1">
-            <a:schemeClr val="accent2"/>
-          </a:lnRef>
-          <a:fillRef idx="2">
-            <a:schemeClr val="accent2"/>
-          </a:fillRef>
-          <a:effectRef idx="1">
-            <a:schemeClr val="accent2"/>
-          </a:effectRef>
-          <a:fontRef idx="minor">
-            <a:schemeClr val="dk1"/>
-          </a:fontRef>
-        </p:style>
-      </p:cxnSp>
-      <p:sp>
-        <p:nvSpPr>
-          <p:cNvPr id="108" name="Rectangle 8"/>
-          <p:cNvSpPr/>
-          <p:nvPr/>
-        </p:nvSpPr>
-        <p:spPr>
-          <a:xfrm>
-            <a:off x="7411906" y="2887216"/>
-            <a:ext cx="893894" cy="285783"/>
-          </a:xfrm>
-          <a:prstGeom prst="rect">
-            <a:avLst/>
-          </a:prstGeom>
-          <a:ln w="19050">
-            <a:solidFill>
-              <a:srgbClr val="7030A0"/>
-            </a:solidFill>
-          </a:ln>
-          <a:effectLst/>
-        </p:spPr>
-        <p:style>
-          <a:lnRef idx="1">
-            <a:schemeClr val="accent4"/>
-          </a:lnRef>
-          <a:fillRef idx="2">
-            <a:schemeClr val="accent4"/>
-          </a:fillRef>
-          <a:effectRef idx="1">
-            <a:schemeClr val="accent4"/>
-          </a:effectRef>
-          <a:fontRef idx="minor">
-            <a:schemeClr val="dk1"/>
-          </a:fontRef>
-        </p:style>
-        <p:txBody>
-          <a:bodyPr rtlCol="0" anchor="ctr"/>
-          <a:lstStyle/>
-          <a:p>
-            <a:pPr algn="ctr"/>
-            <a:r>
-              <a:rPr lang="en-US" sz="1050" dirty="0" smtClean="0">
-                <a:solidFill>
-                  <a:srgbClr val="7030A0"/>
-                </a:solidFill>
-              </a:rPr>
-              <a:t>Start time</a:t>
-            </a:r>
-            <a:endParaRPr lang="en-SG" sz="1050" dirty="0">
-              <a:solidFill>
-                <a:srgbClr val="7030A0"/>
-              </a:solidFill>
-            </a:endParaRPr>
-          </a:p>
-        </p:txBody>
-      </p:sp>
-      <p:cxnSp>
-        <p:nvCxnSpPr>
-          <p:cNvPr id="109" name="Elbow Connector 108"/>
-          <p:cNvCxnSpPr>
-            <a:stCxn id="105" idx="3"/>
-            <a:endCxn id="108" idx="1"/>
-          </p:cNvCxnSpPr>
-          <p:nvPr/>
-        </p:nvCxnSpPr>
-        <p:spPr>
-          <a:xfrm flipV="1">
-            <a:off x="6977504" y="3030108"/>
-            <a:ext cx="434402" cy="4783"/>
-          </a:xfrm>
-          <a:prstGeom prst="bentConnector3">
-            <a:avLst/>
-          </a:prstGeom>
-          <a:ln w="19050">
-            <a:solidFill>
-              <a:srgbClr val="7030A0"/>
-            </a:solidFill>
-            <a:headEnd type="none" w="med" len="med"/>
-            <a:tailEnd type="arrow" w="med" len="med"/>
-          </a:ln>
-          <a:effectLst/>
-        </p:spPr>
-        <p:style>
-          <a:lnRef idx="1">
-            <a:schemeClr val="accent2"/>
-          </a:lnRef>
-          <a:fillRef idx="2">
-            <a:schemeClr val="accent2"/>
-          </a:fillRef>
-          <a:effectRef idx="1">
-            <a:schemeClr val="accent2"/>
-          </a:effectRef>
-          <a:fontRef idx="minor">
-            <a:schemeClr val="dk1"/>
-          </a:fontRef>
-        </p:style>
-      </p:cxnSp>
-      <p:sp>
-        <p:nvSpPr>
-          <p:cNvPr id="110" name="Rectangle 8"/>
-          <p:cNvSpPr/>
-          <p:nvPr/>
-        </p:nvSpPr>
-        <p:spPr>
-          <a:xfrm>
-            <a:off x="7411906" y="3210194"/>
-            <a:ext cx="893894" cy="285783"/>
-          </a:xfrm>
-          <a:prstGeom prst="rect">
-            <a:avLst/>
-          </a:prstGeom>
-          <a:ln w="19050">
-            <a:solidFill>
-              <a:srgbClr val="7030A0"/>
-            </a:solidFill>
-          </a:ln>
-          <a:effectLst/>
-        </p:spPr>
-        <p:style>
-          <a:lnRef idx="1">
-            <a:schemeClr val="accent4"/>
-          </a:lnRef>
-          <a:fillRef idx="2">
-            <a:schemeClr val="accent4"/>
-          </a:fillRef>
-          <a:effectRef idx="1">
-            <a:schemeClr val="accent4"/>
-          </a:effectRef>
-          <a:fontRef idx="minor">
-            <a:schemeClr val="dk1"/>
-          </a:fontRef>
-        </p:style>
-        <p:txBody>
-          <a:bodyPr rtlCol="0" anchor="ctr"/>
-          <a:lstStyle/>
-          <a:p>
-            <a:pPr algn="ctr"/>
-            <a:r>
-              <a:rPr lang="en-US" sz="1050" dirty="0" smtClean="0">
-                <a:solidFill>
-                  <a:srgbClr val="7030A0"/>
-                </a:solidFill>
-              </a:rPr>
-              <a:t>End time</a:t>
-            </a:r>
-            <a:endParaRPr lang="en-SG" sz="1050" dirty="0">
-              <a:solidFill>
-                <a:srgbClr val="7030A0"/>
-              </a:solidFill>
-            </a:endParaRPr>
-          </a:p>
-        </p:txBody>
-      </p:sp>
-      <p:cxnSp>
-        <p:nvCxnSpPr>
-          <p:cNvPr id="111" name="Elbow Connector 110"/>
-          <p:cNvCxnSpPr>
-            <a:stCxn id="105" idx="3"/>
-            <a:endCxn id="110" idx="1"/>
-          </p:cNvCxnSpPr>
-          <p:nvPr/>
-        </p:nvCxnSpPr>
-        <p:spPr>
-          <a:xfrm>
-            <a:off x="6977504" y="3034891"/>
-            <a:ext cx="434402" cy="318195"/>
-          </a:xfrm>
-          <a:prstGeom prst="bentConnector3">
-            <a:avLst/>
-          </a:prstGeom>
-          <a:ln w="19050">
-            <a:solidFill>
-              <a:srgbClr val="7030A0"/>
-            </a:solidFill>
-            <a:headEnd type="none" w="med" len="med"/>
-            <a:tailEnd type="arrow" w="med" len="med"/>
-          </a:ln>
-          <a:effectLst/>
-        </p:spPr>
-        <p:style>
-          <a:lnRef idx="1">
-            <a:schemeClr val="accent2"/>
-          </a:lnRef>
-          <a:fillRef idx="2">
-            <a:schemeClr val="accent2"/>
-          </a:fillRef>
-          <a:effectRef idx="1">
-            <a:schemeClr val="accent2"/>
-          </a:effectRef>
-          <a:fontRef idx="minor">
-            <a:schemeClr val="dk1"/>
-          </a:fontRef>
-        </p:style>
-      </p:cxnSp>
-      <p:sp>
-        <p:nvSpPr>
-          <p:cNvPr id="112" name="Rectangle 8"/>
-          <p:cNvSpPr/>
-          <p:nvPr/>
-        </p:nvSpPr>
-        <p:spPr>
-          <a:xfrm>
-            <a:off x="7411906" y="3533171"/>
-            <a:ext cx="893894" cy="285783"/>
-          </a:xfrm>
-          <a:prstGeom prst="rect">
-            <a:avLst/>
-          </a:prstGeom>
-          <a:ln w="19050">
-            <a:solidFill>
-              <a:srgbClr val="7030A0"/>
-            </a:solidFill>
-          </a:ln>
-          <a:effectLst/>
-        </p:spPr>
-        <p:style>
-          <a:lnRef idx="1">
-            <a:schemeClr val="accent4"/>
-          </a:lnRef>
-          <a:fillRef idx="2">
-            <a:schemeClr val="accent4"/>
-          </a:fillRef>
-          <a:effectRef idx="1">
-            <a:schemeClr val="accent4"/>
-          </a:effectRef>
-          <a:fontRef idx="minor">
-            <a:schemeClr val="dk1"/>
-          </a:fontRef>
-        </p:style>
-        <p:txBody>
-          <a:bodyPr rtlCol="0" anchor="ctr"/>
-          <a:lstStyle/>
-          <a:p>
-            <a:pPr algn="ctr"/>
-            <a:r>
-              <a:rPr lang="en-US" sz="1050" dirty="0" smtClean="0">
-                <a:solidFill>
-                  <a:srgbClr val="7030A0"/>
-                </a:solidFill>
-              </a:rPr>
-              <a:t>Priority</a:t>
-            </a:r>
-            <a:endParaRPr lang="en-SG" sz="1050" dirty="0">
-              <a:solidFill>
-                <a:srgbClr val="7030A0"/>
-              </a:solidFill>
-            </a:endParaRPr>
-          </a:p>
-        </p:txBody>
-      </p:sp>
-      <p:cxnSp>
-        <p:nvCxnSpPr>
-          <p:cNvPr id="113" name="Elbow Connector 112"/>
-          <p:cNvCxnSpPr>
-            <a:stCxn id="105" idx="3"/>
-            <a:endCxn id="112" idx="1"/>
-          </p:cNvCxnSpPr>
-          <p:nvPr/>
-        </p:nvCxnSpPr>
-        <p:spPr>
-          <a:xfrm>
-            <a:off x="6977504" y="3034891"/>
-            <a:ext cx="434402" cy="641172"/>
-          </a:xfrm>
-          <a:prstGeom prst="bentConnector3">
-            <a:avLst/>
-          </a:prstGeom>
-          <a:ln w="19050">
-            <a:solidFill>
-              <a:srgbClr val="7030A0"/>
-            </a:solidFill>
-            <a:headEnd type="none" w="med" len="med"/>
-            <a:tailEnd type="arrow" w="med" len="med"/>
-          </a:ln>
-          <a:effectLst/>
-        </p:spPr>
-        <p:style>
-          <a:lnRef idx="1">
-            <a:schemeClr val="accent2"/>
-          </a:lnRef>
-          <a:fillRef idx="2">
-            <a:schemeClr val="accent2"/>
-          </a:fillRef>
-          <a:effectRef idx="1">
-            <a:schemeClr val="accent2"/>
-          </a:effectRef>
-          <a:fontRef idx="minor">
-            <a:schemeClr val="dk1"/>
-          </a:fontRef>
-        </p:style>
-      </p:cxnSp>
+            <a:endParaRPr lang="en-US" sz="1050" dirty="0"/>
+          </a:p>
+        </p:txBody>
+      </p:sp>
       <p:cxnSp>
         <p:nvCxnSpPr>
           <p:cNvPr id="115" name="Elbow Connector 63"/>
@@ -16264,7 +16092,7 @@
         </p:nvCxnSpPr>
         <p:spPr>
           <a:xfrm rot="16200000" flipH="1">
-            <a:off x="2978830" y="2485431"/>
+            <a:off x="2394630" y="2358431"/>
             <a:ext cx="293825" cy="1"/>
           </a:xfrm>
           <a:prstGeom prst="bentConnector3">
@@ -16305,7 +16133,7 @@
         </p:nvSpPr>
         <p:spPr>
           <a:xfrm rot="10800000" flipV="1">
-            <a:off x="2990490" y="2162997"/>
+            <a:off x="2406290" y="2035997"/>
             <a:ext cx="270504" cy="175523"/>
           </a:xfrm>
           <a:prstGeom prst="triangle">
@@ -16337,7 +16165,7 @@
           <a:lstStyle/>
           <a:p>
             <a:pPr algn="ctr"/>
-            <a:endParaRPr lang="en-SG" sz="1050" b="1">
+            <a:endParaRPr lang="en-SG" sz="1050" b="1" dirty="0">
               <a:solidFill>
                 <a:srgbClr val="92D050"/>
               </a:solidFill>
@@ -16353,7 +16181,7 @@
         </p:nvSpPr>
         <p:spPr>
           <a:xfrm>
-            <a:off x="2359812" y="1806470"/>
+            <a:off x="1775612" y="1679470"/>
             <a:ext cx="1539926" cy="346760"/>
           </a:xfrm>
           <a:prstGeom prst="rect">
@@ -16401,7 +16229,7 @@
               </a:rPr>
             </a:br>
             <a:r>
-              <a:rPr lang="en-US" sz="1050" dirty="0" err="1" smtClean="0">
+              <a:rPr lang="en-US" sz="1050" dirty="0" smtClean="0">
                 <a:solidFill>
                   <a:srgbClr val="7030A0"/>
                 </a:solidFill>
@@ -16424,7 +16252,7 @@
         </p:nvSpPr>
         <p:spPr>
           <a:xfrm rot="16200000">
-            <a:off x="6280863" y="3514530"/>
+            <a:off x="5696663" y="3387530"/>
             <a:ext cx="881018" cy="261610"/>
           </a:xfrm>
           <a:prstGeom prst="rect">
@@ -16463,7 +16291,7 @@
         </p:nvSpPr>
         <p:spPr>
           <a:xfrm>
-            <a:off x="1756909" y="4239491"/>
+            <a:off x="1172709" y="4112491"/>
             <a:ext cx="1775949" cy="346760"/>
           </a:xfrm>
           <a:prstGeom prst="rect">
@@ -16519,7 +16347,7 @@
               </a:rPr>
             </a:br>
             <a:r>
-              <a:rPr lang="en-US" sz="1050" dirty="0" err="1" smtClean="0">
+              <a:rPr lang="en-US" sz="1050" dirty="0" smtClean="0">
                 <a:solidFill>
                   <a:srgbClr val="7030A0"/>
                 </a:solidFill>
@@ -16545,7 +16373,7 @@
         </p:nvCxnSpPr>
         <p:spPr>
           <a:xfrm rot="16200000" flipH="1">
-            <a:off x="1063984" y="3719945"/>
+            <a:off x="479784" y="3592945"/>
             <a:ext cx="831471" cy="554380"/>
           </a:xfrm>
           <a:prstGeom prst="bentConnector2">
@@ -16578,13 +16406,401 @@
       </p:cxnSp>
       <p:sp>
         <p:nvSpPr>
+          <p:cNvPr id="104" name="Rectangle 8"/>
+          <p:cNvSpPr/>
+          <p:nvPr/>
+        </p:nvSpPr>
+        <p:spPr>
+          <a:xfrm>
+            <a:off x="8089791" y="2441653"/>
+            <a:ext cx="893894" cy="285783"/>
+          </a:xfrm>
+          <a:prstGeom prst="rect">
+            <a:avLst/>
+          </a:prstGeom>
+          <a:ln w="19050">
+            <a:solidFill>
+              <a:srgbClr val="7030A0"/>
+            </a:solidFill>
+          </a:ln>
+          <a:effectLst/>
+        </p:spPr>
+        <p:style>
+          <a:lnRef idx="1">
+            <a:schemeClr val="accent4"/>
+          </a:lnRef>
+          <a:fillRef idx="2">
+            <a:schemeClr val="accent4"/>
+          </a:fillRef>
+          <a:effectRef idx="1">
+            <a:schemeClr val="accent4"/>
+          </a:effectRef>
+          <a:fontRef idx="minor">
+            <a:schemeClr val="dk1"/>
+          </a:fontRef>
+        </p:style>
+        <p:txBody>
+          <a:bodyPr rtlCol="0" anchor="ctr"/>
+          <a:lstStyle/>
+          <a:p>
+            <a:pPr algn="ctr"/>
+            <a:r>
+              <a:rPr lang="en-US" sz="1050" dirty="0" smtClean="0">
+                <a:solidFill>
+                  <a:srgbClr val="7030A0"/>
+                </a:solidFill>
+              </a:rPr>
+              <a:t>Venue</a:t>
+            </a:r>
+            <a:endParaRPr lang="en-SG" sz="1050" dirty="0">
+              <a:solidFill>
+                <a:srgbClr val="7030A0"/>
+              </a:solidFill>
+            </a:endParaRPr>
+          </a:p>
+        </p:txBody>
+      </p:sp>
+      <p:cxnSp>
+        <p:nvCxnSpPr>
+          <p:cNvPr id="106" name="Elbow Connector 105"/>
+          <p:cNvCxnSpPr>
+            <a:stCxn id="57" idx="3"/>
+            <a:endCxn id="104" idx="1"/>
+          </p:cNvCxnSpPr>
+          <p:nvPr/>
+        </p:nvCxnSpPr>
+        <p:spPr>
+          <a:xfrm flipV="1">
+            <a:off x="7706566" y="2584545"/>
+            <a:ext cx="383225" cy="328509"/>
+          </a:xfrm>
+          <a:prstGeom prst="bentConnector3">
+            <a:avLst/>
+          </a:prstGeom>
+          <a:ln w="19050">
+            <a:solidFill>
+              <a:srgbClr val="7030A0"/>
+            </a:solidFill>
+            <a:headEnd type="none" w="med" len="med"/>
+            <a:tailEnd type="none" w="med" len="med"/>
+          </a:ln>
+          <a:effectLst/>
+        </p:spPr>
+        <p:style>
+          <a:lnRef idx="1">
+            <a:schemeClr val="accent2"/>
+          </a:lnRef>
+          <a:fillRef idx="2">
+            <a:schemeClr val="accent2"/>
+          </a:fillRef>
+          <a:effectRef idx="1">
+            <a:schemeClr val="accent2"/>
+          </a:effectRef>
+          <a:fontRef idx="minor">
+            <a:schemeClr val="dk1"/>
+          </a:fontRef>
+        </p:style>
+      </p:cxnSp>
+      <p:sp>
+        <p:nvSpPr>
+          <p:cNvPr id="108" name="Rectangle 8"/>
+          <p:cNvSpPr/>
+          <p:nvPr/>
+        </p:nvSpPr>
+        <p:spPr>
+          <a:xfrm>
+            <a:off x="8089791" y="2764631"/>
+            <a:ext cx="893894" cy="285783"/>
+          </a:xfrm>
+          <a:prstGeom prst="rect">
+            <a:avLst/>
+          </a:prstGeom>
+          <a:ln w="19050">
+            <a:solidFill>
+              <a:srgbClr val="7030A0"/>
+            </a:solidFill>
+          </a:ln>
+          <a:effectLst/>
+        </p:spPr>
+        <p:style>
+          <a:lnRef idx="1">
+            <a:schemeClr val="accent4"/>
+          </a:lnRef>
+          <a:fillRef idx="2">
+            <a:schemeClr val="accent4"/>
+          </a:fillRef>
+          <a:effectRef idx="1">
+            <a:schemeClr val="accent4"/>
+          </a:effectRef>
+          <a:fontRef idx="minor">
+            <a:schemeClr val="dk1"/>
+          </a:fontRef>
+        </p:style>
+        <p:txBody>
+          <a:bodyPr rtlCol="0" anchor="ctr"/>
+          <a:lstStyle/>
+          <a:p>
+            <a:pPr algn="ctr"/>
+            <a:r>
+              <a:rPr lang="en-US" sz="1050" dirty="0" smtClean="0">
+                <a:solidFill>
+                  <a:srgbClr val="7030A0"/>
+                </a:solidFill>
+              </a:rPr>
+              <a:t>Start time</a:t>
+            </a:r>
+            <a:endParaRPr lang="en-SG" sz="1050" dirty="0">
+              <a:solidFill>
+                <a:srgbClr val="7030A0"/>
+              </a:solidFill>
+            </a:endParaRPr>
+          </a:p>
+        </p:txBody>
+      </p:sp>
+      <p:cxnSp>
+        <p:nvCxnSpPr>
+          <p:cNvPr id="109" name="Elbow Connector 108"/>
+          <p:cNvCxnSpPr>
+            <a:stCxn id="57" idx="3"/>
+            <a:endCxn id="108" idx="1"/>
+          </p:cNvCxnSpPr>
+          <p:nvPr/>
+        </p:nvCxnSpPr>
+        <p:spPr>
+          <a:xfrm flipV="1">
+            <a:off x="7706566" y="2907523"/>
+            <a:ext cx="383225" cy="5531"/>
+          </a:xfrm>
+          <a:prstGeom prst="bentConnector3">
+            <a:avLst/>
+          </a:prstGeom>
+          <a:ln w="19050">
+            <a:solidFill>
+              <a:srgbClr val="7030A0"/>
+            </a:solidFill>
+            <a:headEnd type="none" w="med" len="med"/>
+            <a:tailEnd type="none" w="med" len="med"/>
+          </a:ln>
+          <a:effectLst/>
+        </p:spPr>
+        <p:style>
+          <a:lnRef idx="1">
+            <a:schemeClr val="accent2"/>
+          </a:lnRef>
+          <a:fillRef idx="2">
+            <a:schemeClr val="accent2"/>
+          </a:fillRef>
+          <a:effectRef idx="1">
+            <a:schemeClr val="accent2"/>
+          </a:effectRef>
+          <a:fontRef idx="minor">
+            <a:schemeClr val="dk1"/>
+          </a:fontRef>
+        </p:style>
+      </p:cxnSp>
+      <p:sp>
+        <p:nvSpPr>
+          <p:cNvPr id="110" name="Rectangle 8"/>
+          <p:cNvSpPr/>
+          <p:nvPr/>
+        </p:nvSpPr>
+        <p:spPr>
+          <a:xfrm>
+            <a:off x="8089791" y="3087609"/>
+            <a:ext cx="893894" cy="285783"/>
+          </a:xfrm>
+          <a:prstGeom prst="rect">
+            <a:avLst/>
+          </a:prstGeom>
+          <a:ln w="19050">
+            <a:solidFill>
+              <a:srgbClr val="7030A0"/>
+            </a:solidFill>
+          </a:ln>
+          <a:effectLst/>
+        </p:spPr>
+        <p:style>
+          <a:lnRef idx="1">
+            <a:schemeClr val="accent4"/>
+          </a:lnRef>
+          <a:fillRef idx="2">
+            <a:schemeClr val="accent4"/>
+          </a:fillRef>
+          <a:effectRef idx="1">
+            <a:schemeClr val="accent4"/>
+          </a:effectRef>
+          <a:fontRef idx="minor">
+            <a:schemeClr val="dk1"/>
+          </a:fontRef>
+        </p:style>
+        <p:txBody>
+          <a:bodyPr rtlCol="0" anchor="ctr"/>
+          <a:lstStyle/>
+          <a:p>
+            <a:pPr algn="ctr"/>
+            <a:r>
+              <a:rPr lang="en-US" sz="1050" dirty="0" smtClean="0">
+                <a:solidFill>
+                  <a:srgbClr val="7030A0"/>
+                </a:solidFill>
+              </a:rPr>
+              <a:t>End time</a:t>
+            </a:r>
+            <a:endParaRPr lang="en-SG" sz="1050" dirty="0">
+              <a:solidFill>
+                <a:srgbClr val="7030A0"/>
+              </a:solidFill>
+            </a:endParaRPr>
+          </a:p>
+        </p:txBody>
+      </p:sp>
+      <p:cxnSp>
+        <p:nvCxnSpPr>
+          <p:cNvPr id="111" name="Elbow Connector 110"/>
+          <p:cNvCxnSpPr>
+            <a:stCxn id="57" idx="3"/>
+            <a:endCxn id="110" idx="1"/>
+          </p:cNvCxnSpPr>
+          <p:nvPr/>
+        </p:nvCxnSpPr>
+        <p:spPr>
+          <a:xfrm>
+            <a:off x="7706566" y="2913054"/>
+            <a:ext cx="383225" cy="317447"/>
+          </a:xfrm>
+          <a:prstGeom prst="bentConnector3">
+            <a:avLst/>
+          </a:prstGeom>
+          <a:ln w="19050">
+            <a:solidFill>
+              <a:srgbClr val="7030A0"/>
+            </a:solidFill>
+            <a:headEnd type="none" w="med" len="med"/>
+            <a:tailEnd type="none" w="med" len="med"/>
+          </a:ln>
+          <a:effectLst/>
+        </p:spPr>
+        <p:style>
+          <a:lnRef idx="1">
+            <a:schemeClr val="accent2"/>
+          </a:lnRef>
+          <a:fillRef idx="2">
+            <a:schemeClr val="accent2"/>
+          </a:fillRef>
+          <a:effectRef idx="1">
+            <a:schemeClr val="accent2"/>
+          </a:effectRef>
+          <a:fontRef idx="minor">
+            <a:schemeClr val="dk1"/>
+          </a:fontRef>
+        </p:style>
+      </p:cxnSp>
+      <p:sp>
+        <p:nvSpPr>
+          <p:cNvPr id="112" name="Rectangle 8"/>
+          <p:cNvSpPr/>
+          <p:nvPr/>
+        </p:nvSpPr>
+        <p:spPr>
+          <a:xfrm>
+            <a:off x="8089791" y="3410586"/>
+            <a:ext cx="893894" cy="285783"/>
+          </a:xfrm>
+          <a:prstGeom prst="rect">
+            <a:avLst/>
+          </a:prstGeom>
+          <a:ln w="19050">
+            <a:solidFill>
+              <a:srgbClr val="7030A0"/>
+            </a:solidFill>
+          </a:ln>
+          <a:effectLst/>
+        </p:spPr>
+        <p:style>
+          <a:lnRef idx="1">
+            <a:schemeClr val="accent4"/>
+          </a:lnRef>
+          <a:fillRef idx="2">
+            <a:schemeClr val="accent4"/>
+          </a:fillRef>
+          <a:effectRef idx="1">
+            <a:schemeClr val="accent4"/>
+          </a:effectRef>
+          <a:fontRef idx="minor">
+            <a:schemeClr val="dk1"/>
+          </a:fontRef>
+        </p:style>
+        <p:txBody>
+          <a:bodyPr rtlCol="0" anchor="ctr"/>
+          <a:lstStyle/>
+          <a:p>
+            <a:pPr algn="ctr"/>
+            <a:r>
+              <a:rPr lang="en-US" sz="1050" dirty="0" smtClean="0">
+                <a:solidFill>
+                  <a:srgbClr val="7030A0"/>
+                </a:solidFill>
+              </a:rPr>
+              <a:t>Priority</a:t>
+            </a:r>
+            <a:endParaRPr lang="en-SG" sz="1050" dirty="0">
+              <a:solidFill>
+                <a:srgbClr val="7030A0"/>
+              </a:solidFill>
+            </a:endParaRPr>
+          </a:p>
+        </p:txBody>
+      </p:sp>
+      <p:cxnSp>
+        <p:nvCxnSpPr>
+          <p:cNvPr id="113" name="Elbow Connector 112"/>
+          <p:cNvCxnSpPr>
+            <a:stCxn id="57" idx="3"/>
+            <a:endCxn id="112" idx="1"/>
+          </p:cNvCxnSpPr>
+          <p:nvPr/>
+        </p:nvCxnSpPr>
+        <p:spPr>
+          <a:xfrm>
+            <a:off x="7706566" y="2913054"/>
+            <a:ext cx="383225" cy="640424"/>
+          </a:xfrm>
+          <a:prstGeom prst="bentConnector3">
+            <a:avLst/>
+          </a:prstGeom>
+          <a:ln w="19050">
+            <a:solidFill>
+              <a:srgbClr val="7030A0"/>
+            </a:solidFill>
+            <a:headEnd type="none" w="med" len="med"/>
+            <a:tailEnd type="none" w="med" len="med"/>
+          </a:ln>
+          <a:effectLst/>
+        </p:spPr>
+        <p:style>
+          <a:lnRef idx="1">
+            <a:schemeClr val="accent2"/>
+          </a:lnRef>
+          <a:fillRef idx="2">
+            <a:schemeClr val="accent2"/>
+          </a:fillRef>
+          <a:effectRef idx="1">
+            <a:schemeClr val="accent2"/>
+          </a:effectRef>
+          <a:fontRef idx="minor">
+            <a:schemeClr val="dk1"/>
+          </a:fontRef>
+        </p:style>
+      </p:cxnSp>
+      <p:sp>
+        <p:nvSpPr>
           <p:cNvPr id="126" name="Rectangle 8"/>
           <p:cNvSpPr/>
           <p:nvPr/>
         </p:nvSpPr>
         <p:spPr>
           <a:xfrm>
-            <a:off x="7411906" y="2237501"/>
+            <a:off x="8089791" y="2114916"/>
             <a:ext cx="893894" cy="285783"/>
           </a:xfrm>
           <a:prstGeom prst="rect">
@@ -16617,7 +16833,7 @@
           <a:p>
             <a:pPr algn="ctr"/>
             <a:r>
-              <a:rPr lang="en-US" sz="1050" dirty="0" err="1" smtClean="0">
+              <a:rPr lang="en-US" sz="1050" dirty="0" smtClean="0">
                 <a:solidFill>
                   <a:srgbClr val="7030A0"/>
                 </a:solidFill>
@@ -16636,15 +16852,15 @@
         <p:nvCxnSpPr>
           <p:cNvPr id="127" name="Elbow Connector 126"/>
           <p:cNvCxnSpPr>
-            <a:stCxn id="105" idx="3"/>
+            <a:stCxn id="57" idx="3"/>
             <a:endCxn id="126" idx="1"/>
           </p:cNvCxnSpPr>
           <p:nvPr/>
         </p:nvCxnSpPr>
         <p:spPr>
           <a:xfrm flipV="1">
-            <a:off x="6977504" y="2380393"/>
-            <a:ext cx="434402" cy="654498"/>
+            <a:off x="7706566" y="2257808"/>
+            <a:ext cx="383225" cy="655246"/>
           </a:xfrm>
           <a:prstGeom prst="bentConnector3">
             <a:avLst/>
@@ -16654,7 +16870,7 @@
               <a:srgbClr val="7030A0"/>
             </a:solidFill>
             <a:headEnd type="none" w="med" len="med"/>
-            <a:tailEnd type="arrow" w="med" len="med"/>
+            <a:tailEnd type="none" w="med" len="med"/>
           </a:ln>
           <a:effectLst/>
         </p:spPr>
@@ -16681,7 +16897,7 @@
         </p:nvSpPr>
         <p:spPr>
           <a:xfrm>
-            <a:off x="7411906" y="3856148"/>
+            <a:off x="8089791" y="3733563"/>
             <a:ext cx="893894" cy="285783"/>
           </a:xfrm>
           <a:prstGeom prst="rect">
@@ -16733,20 +16949,231 @@
         <p:nvCxnSpPr>
           <p:cNvPr id="129" name="Elbow Connector 128"/>
           <p:cNvCxnSpPr>
-            <a:stCxn id="105" idx="3"/>
+            <a:stCxn id="57" idx="3"/>
             <a:endCxn id="128" idx="1"/>
           </p:cNvCxnSpPr>
           <p:nvPr/>
         </p:nvCxnSpPr>
         <p:spPr>
           <a:xfrm>
-            <a:off x="6977504" y="3034891"/>
-            <a:ext cx="434402" cy="964149"/>
+            <a:off x="7706566" y="2913054"/>
+            <a:ext cx="383225" cy="963401"/>
           </a:xfrm>
           <a:prstGeom prst="bentConnector3">
             <a:avLst>
               <a:gd name="adj1" fmla="val 50000"/>
             </a:avLst>
+          </a:prstGeom>
+          <a:ln w="19050">
+            <a:solidFill>
+              <a:srgbClr val="7030A0"/>
+            </a:solidFill>
+            <a:headEnd type="none" w="med" len="med"/>
+            <a:tailEnd type="none" w="med" len="med"/>
+          </a:ln>
+          <a:effectLst/>
+        </p:spPr>
+        <p:style>
+          <a:lnRef idx="1">
+            <a:schemeClr val="accent2"/>
+          </a:lnRef>
+          <a:fillRef idx="2">
+            <a:schemeClr val="accent2"/>
+          </a:fillRef>
+          <a:effectRef idx="1">
+            <a:schemeClr val="accent2"/>
+          </a:effectRef>
+          <a:fontRef idx="minor">
+            <a:schemeClr val="dk1"/>
+          </a:fontRef>
+        </p:style>
+      </p:cxnSp>
+      <p:cxnSp>
+        <p:nvCxnSpPr>
+          <p:cNvPr id="49" name="Elbow Connector 48"/>
+          <p:cNvCxnSpPr>
+            <a:stCxn id="57" idx="3"/>
+            <a:endCxn id="98" idx="3"/>
+          </p:cNvCxnSpPr>
+          <p:nvPr/>
+        </p:nvCxnSpPr>
+        <p:spPr>
+          <a:xfrm flipH="1" flipV="1">
+            <a:off x="6138784" y="2331964"/>
+            <a:ext cx="1567782" cy="581090"/>
+          </a:xfrm>
+          <a:prstGeom prst="bentConnector3">
+            <a:avLst>
+              <a:gd name="adj1" fmla="val -12210"/>
+            </a:avLst>
+          </a:prstGeom>
+          <a:ln w="19050">
+            <a:solidFill>
+              <a:srgbClr val="7030A0"/>
+            </a:solidFill>
+            <a:headEnd type="none" w="med" len="med"/>
+            <a:tailEnd type="none" w="med" len="med"/>
+          </a:ln>
+          <a:effectLst/>
+        </p:spPr>
+        <p:style>
+          <a:lnRef idx="1">
+            <a:schemeClr val="accent2"/>
+          </a:lnRef>
+          <a:fillRef idx="2">
+            <a:schemeClr val="accent2"/>
+          </a:fillRef>
+          <a:effectRef idx="1">
+            <a:schemeClr val="accent2"/>
+          </a:effectRef>
+          <a:fontRef idx="minor">
+            <a:schemeClr val="dk1"/>
+          </a:fontRef>
+        </p:style>
+      </p:cxnSp>
+      <p:sp>
+        <p:nvSpPr>
+          <p:cNvPr id="55" name="Rectangle 8"/>
+          <p:cNvSpPr/>
+          <p:nvPr/>
+        </p:nvSpPr>
+        <p:spPr>
+          <a:xfrm>
+            <a:off x="6631923" y="2739672"/>
+            <a:ext cx="899119" cy="346760"/>
+          </a:xfrm>
+          <a:prstGeom prst="rect">
+            <a:avLst/>
+          </a:prstGeom>
+          <a:ln w="19050">
+            <a:solidFill>
+              <a:srgbClr val="7030A0"/>
+            </a:solidFill>
+          </a:ln>
+          <a:effectLst/>
+        </p:spPr>
+        <p:style>
+          <a:lnRef idx="1">
+            <a:schemeClr val="accent4"/>
+          </a:lnRef>
+          <a:fillRef idx="2">
+            <a:schemeClr val="accent4"/>
+          </a:fillRef>
+          <a:effectRef idx="1">
+            <a:schemeClr val="accent4"/>
+          </a:effectRef>
+          <a:fontRef idx="minor">
+            <a:schemeClr val="dk1"/>
+          </a:fontRef>
+        </p:style>
+        <p:txBody>
+          <a:bodyPr rtlCol="0" anchor="ctr"/>
+          <a:lstStyle/>
+          <a:p>
+            <a:pPr algn="ctr"/>
+            <a:r>
+              <a:rPr lang="en-US" sz="1050" dirty="0" smtClean="0">
+                <a:solidFill>
+                  <a:srgbClr val="7030A0"/>
+                </a:solidFill>
+              </a:rPr>
+              <a:t>{abstract} TaskProperty</a:t>
+            </a:r>
+            <a:endParaRPr lang="en-SG" sz="1050" dirty="0">
+              <a:solidFill>
+                <a:srgbClr val="7030A0"/>
+              </a:solidFill>
+            </a:endParaRPr>
+          </a:p>
+        </p:txBody>
+      </p:sp>
+      <p:sp>
+        <p:nvSpPr>
+          <p:cNvPr id="57" name="Isosceles Triangle 102"/>
+          <p:cNvSpPr/>
+          <p:nvPr/>
+        </p:nvSpPr>
+        <p:spPr>
+          <a:xfrm rot="5400000" flipV="1">
+            <a:off x="7483552" y="2825292"/>
+            <a:ext cx="270504" cy="175523"/>
+          </a:xfrm>
+          <a:prstGeom prst="triangle">
+            <a:avLst/>
+          </a:prstGeom>
+          <a:gradFill flip="none" rotWithShape="1">
+            <a:gsLst>
+              <a:gs pos="0">
+                <a:srgbClr val="7030A0">
+                  <a:tint val="66000"/>
+                  <a:satMod val="160000"/>
+                </a:srgbClr>
+              </a:gs>
+              <a:gs pos="50000">
+                <a:srgbClr val="7030A0">
+                  <a:tint val="44500"/>
+                  <a:satMod val="160000"/>
+                </a:srgbClr>
+              </a:gs>
+              <a:gs pos="100000">
+                <a:srgbClr val="7030A0">
+                  <a:tint val="23500"/>
+                  <a:satMod val="160000"/>
+                </a:srgbClr>
+              </a:gs>
+            </a:gsLst>
+            <a:lin ang="16200000" scaled="1"/>
+            <a:tileRect/>
+          </a:gradFill>
+          <a:ln w="19050">
+            <a:solidFill>
+              <a:srgbClr val="7030A0"/>
+            </a:solidFill>
+          </a:ln>
+          <a:effectLst/>
+        </p:spPr>
+        <p:style>
+          <a:lnRef idx="1">
+            <a:schemeClr val="accent1"/>
+          </a:lnRef>
+          <a:fillRef idx="2">
+            <a:schemeClr val="accent1"/>
+          </a:fillRef>
+          <a:effectRef idx="1">
+            <a:schemeClr val="accent1"/>
+          </a:effectRef>
+          <a:fontRef idx="minor">
+            <a:schemeClr val="dk1"/>
+          </a:fontRef>
+        </p:style>
+        <p:txBody>
+          <a:bodyPr rtlCol="0" anchor="ctr"/>
+          <a:lstStyle/>
+          <a:p>
+            <a:pPr algn="ctr"/>
+            <a:endParaRPr lang="en-SG" sz="1050" b="1" dirty="0">
+              <a:solidFill>
+                <a:srgbClr val="92D050"/>
+              </a:solidFill>
+            </a:endParaRPr>
+          </a:p>
+        </p:txBody>
+      </p:sp>
+      <p:cxnSp>
+        <p:nvCxnSpPr>
+          <p:cNvPr id="75" name="Elbow Connector 74"/>
+          <p:cNvCxnSpPr>
+            <a:stCxn id="55" idx="1"/>
+          </p:cNvCxnSpPr>
+          <p:nvPr/>
+        </p:nvCxnSpPr>
+        <p:spPr>
+          <a:xfrm rot="10800000">
+            <a:off x="6385835" y="2911066"/>
+            <a:ext cx="246089" cy="1987"/>
+          </a:xfrm>
+          <a:prstGeom prst="bentConnector3">
+            <a:avLst/>
           </a:prstGeom>
           <a:ln w="19050">
             <a:solidFill>
@@ -16937,7 +17364,7 @@
               </a:rPr>
             </a:br>
             <a:r>
-              <a:rPr lang="en-US" sz="1050" dirty="0" err="1" smtClean="0">
+              <a:rPr lang="en-US" sz="1050" dirty="0" smtClean="0">
                 <a:solidFill>
                   <a:schemeClr val="bg1"/>
                 </a:solidFill>
@@ -17000,7 +17427,7 @@
           <a:p>
             <a:pPr algn="ctr"/>
             <a:r>
-              <a:rPr lang="en-US" sz="1050" dirty="0" err="1" smtClean="0">
+              <a:rPr lang="en-US" sz="1050" dirty="0" smtClean="0">
                 <a:solidFill>
                   <a:schemeClr val="bg1"/>
                 </a:solidFill>
@@ -17136,7 +17563,7 @@
           <a:lstStyle/>
           <a:p>
             <a:pPr algn="ctr"/>
-            <a:endParaRPr lang="en-SG" sz="1050">
+            <a:endParaRPr lang="en-SG" sz="1050" dirty="0">
               <a:solidFill>
                 <a:schemeClr val="bg1"/>
               </a:solidFill>
@@ -17316,7 +17743,7 @@
           <a:lstStyle/>
           <a:p>
             <a:pPr algn="ctr"/>
-            <a:endParaRPr lang="en-US" sz="1050">
+            <a:endParaRPr lang="en-US" sz="1050" dirty="0">
               <a:solidFill>
                 <a:schemeClr val="bg1"/>
               </a:solidFill>
@@ -17417,7 +17844,7 @@
           <a:lstStyle/>
           <a:p>
             <a:pPr algn="ctr"/>
-            <a:endParaRPr lang="en-SG" sz="1050">
+            <a:endParaRPr lang="en-SG" sz="1050" dirty="0">
               <a:solidFill>
                 <a:schemeClr val="bg1"/>
               </a:solidFill>
@@ -17507,16 +17934,6 @@
           <a:lstStyle/>
           <a:p>
             <a:pPr algn="ctr"/>
-            <a:r>
-              <a:rPr lang="en-US" sz="1050" b="1" dirty="0" err="1" smtClean="0">
-                <a:solidFill>
-                  <a:schemeClr val="accent6">
-                    <a:lumMod val="75000"/>
-                  </a:schemeClr>
-                </a:solidFill>
-              </a:rPr>
-              <a:t>XmlTaskManager</a:t>
-            </a:r>
             <a:r>
               <a:rPr lang="en-US" sz="1050" b="1" dirty="0" smtClean="0">
                 <a:solidFill>
@@ -17525,7 +17942,7 @@
                   </a:schemeClr>
                 </a:solidFill>
               </a:rPr>
-              <a:t/>
+              <a:t>XmlTaskManager</a:t>
             </a:r>
             <a:br>
               <a:rPr lang="en-US" sz="1050" b="1" dirty="0" smtClean="0">
@@ -17619,7 +18036,7 @@
               </a:rPr>
             </a:br>
             <a:r>
-              <a:rPr lang="en-US" sz="1050" dirty="0" err="1" smtClean="0">
+              <a:rPr lang="en-US" sz="1050" dirty="0" smtClean="0">
                 <a:solidFill>
                   <a:schemeClr val="bg1"/>
                 </a:solidFill>
@@ -17720,7 +18137,7 @@
           <a:lstStyle/>
           <a:p>
             <a:pPr algn="ctr"/>
-            <a:endParaRPr lang="en-US" sz="1050">
+            <a:endParaRPr lang="en-US" sz="1050" dirty="0">
               <a:solidFill>
                 <a:schemeClr val="bg1"/>
               </a:solidFill>
@@ -17821,7 +18238,7 @@
           <a:lstStyle/>
           <a:p>
             <a:pPr algn="ctr"/>
-            <a:endParaRPr lang="en-SG" sz="1050">
+            <a:endParaRPr lang="en-SG" sz="1050" dirty="0">
               <a:solidFill>
                 <a:schemeClr val="bg1"/>
               </a:solidFill>
@@ -17877,20 +18294,12 @@
           <a:p>
             <a:pPr algn="ctr"/>
             <a:r>
-              <a:rPr lang="en-US" sz="1050" dirty="0" err="1" smtClean="0">
+              <a:rPr lang="en-US" sz="1050" dirty="0" smtClean="0">
                 <a:solidFill>
                   <a:schemeClr val="bg1"/>
                 </a:solidFill>
               </a:rPr>
               <a:t>JsonUserPrefs</a:t>
-            </a:r>
-            <a:r>
-              <a:rPr lang="en-US" sz="1050" dirty="0" smtClean="0">
-                <a:solidFill>
-                  <a:schemeClr val="bg1"/>
-                </a:solidFill>
-              </a:rPr>
-              <a:t/>
             </a:r>
             <a:br>
               <a:rPr lang="en-US" sz="1050" dirty="0" smtClean="0">
@@ -17952,7 +18361,7 @@
           <a:p>
             <a:pPr algn="ctr"/>
             <a:r>
-              <a:rPr lang="en-US" sz="1050" b="1" dirty="0" err="1" smtClean="0">
+              <a:rPr lang="en-US" sz="1050" b="1" dirty="0" smtClean="0">
                 <a:solidFill>
                   <a:schemeClr val="accent6">
                     <a:lumMod val="75000"/>
@@ -17960,16 +18369,6 @@
                 </a:solidFill>
               </a:rPr>
               <a:t>XmlSerializable</a:t>
-            </a:r>
-            <a:r>
-              <a:rPr lang="en-US" sz="1050" b="1" dirty="0" smtClean="0">
-                <a:solidFill>
-                  <a:schemeClr val="accent6">
-                    <a:lumMod val="75000"/>
-                  </a:schemeClr>
-                </a:solidFill>
-              </a:rPr>
-              <a:t/>
             </a:r>
             <a:br>
               <a:rPr lang="en-US" sz="1050" b="1" dirty="0" smtClean="0">
@@ -17981,7 +18380,7 @@
               </a:rPr>
             </a:br>
             <a:r>
-              <a:rPr lang="en-US" sz="1050" b="1" dirty="0" err="1" smtClean="0">
+              <a:rPr lang="en-US" sz="1050" b="1" dirty="0" smtClean="0">
                 <a:solidFill>
                   <a:schemeClr val="accent6">
                     <a:lumMod val="75000"/>
@@ -18078,7 +18477,7 @@
           <a:p>
             <a:pPr algn="ctr"/>
             <a:r>
-              <a:rPr lang="en-US" sz="1050" b="1" dirty="0" err="1" smtClean="0">
+              <a:rPr lang="en-US" sz="1050" b="1" dirty="0" smtClean="0">
                 <a:solidFill>
                   <a:schemeClr val="accent6">
                     <a:lumMod val="75000"/>
@@ -18134,7 +18533,7 @@
           <a:p>
             <a:pPr algn="ctr"/>
             <a:r>
-              <a:rPr lang="en-US" sz="1050" b="1" dirty="0" err="1" smtClean="0">
+              <a:rPr lang="en-US" sz="1050" b="1" dirty="0" smtClean="0">
                 <a:solidFill>
                   <a:schemeClr val="accent6">
                     <a:lumMod val="75000"/>

</xml_diff>